<commit_message>
Updated slide 10 with Surender's notes
</commit_message>
<xml_diff>
--- a/Credit_Card_Fraud_Detection-Project4-Group-4.pptx
+++ b/Credit_Card_Fraud_Detection-Project4-Group-4.pptx
@@ -15,9 +15,8 @@
     <p:sldId id="263" r:id="rId9"/>
     <p:sldId id="264" r:id="rId10"/>
     <p:sldId id="270" r:id="rId11"/>
-    <p:sldId id="265" r:id="rId12"/>
-    <p:sldId id="267" r:id="rId13"/>
-    <p:sldId id="266" r:id="rId14"/>
+    <p:sldId id="267" r:id="rId12"/>
+    <p:sldId id="266" r:id="rId13"/>
   </p:sldIdLst>
   <p:sldSz cx="12192000" cy="6858000"/>
   <p:notesSz cx="6858000" cy="9144000"/>
@@ -9885,3504 +9884,6 @@
         <p:spPr>
           <a:xfrm>
             <a:off x="1460066" y="1850033"/>
-            <a:ext cx="6411725" cy="1754326"/>
-          </a:xfrm>
-          <a:prstGeom prst="rect">
-            <a:avLst/>
-          </a:prstGeom>
-          <a:noFill/>
-        </p:spPr>
-        <p:txBody>
-          <a:bodyPr wrap="square" rtlCol="0">
-            <a:spAutoFit/>
-          </a:bodyPr>
-          <a:lstStyle/>
-          <a:p>
-            <a:endParaRPr lang="en-US" dirty="0">
-              <a:solidFill>
-                <a:schemeClr val="tx2"/>
-              </a:solidFill>
-            </a:endParaRPr>
-          </a:p>
-          <a:p>
-            <a:endParaRPr lang="en-US" b="1" dirty="0">
-              <a:solidFill>
-                <a:schemeClr val="tx2"/>
-              </a:solidFill>
-            </a:endParaRPr>
-          </a:p>
-          <a:p>
-            <a:endParaRPr lang="en-US" b="1" dirty="0">
-              <a:solidFill>
-                <a:schemeClr val="tx2"/>
-              </a:solidFill>
-            </a:endParaRPr>
-          </a:p>
-          <a:p>
-            <a:endParaRPr lang="en-US" b="1" dirty="0">
-              <a:solidFill>
-                <a:schemeClr val="tx2"/>
-              </a:solidFill>
-            </a:endParaRPr>
-          </a:p>
-          <a:p>
-            <a:endParaRPr lang="en-US" b="1" dirty="0">
-              <a:solidFill>
-                <a:schemeClr val="tx2"/>
-              </a:solidFill>
-            </a:endParaRPr>
-          </a:p>
-          <a:p>
-            <a:endParaRPr lang="en-US" b="1" dirty="0">
-              <a:solidFill>
-                <a:schemeClr val="tx2"/>
-              </a:solidFill>
-            </a:endParaRPr>
-          </a:p>
-        </p:txBody>
-      </p:sp>
-      <p:sp>
-        <p:nvSpPr>
-          <p:cNvPr id="7" name="TextBox 6">
-            <a:extLst>
-              <a:ext uri="{FF2B5EF4-FFF2-40B4-BE49-F238E27FC236}">
-                <a16:creationId xmlns:a16="http://schemas.microsoft.com/office/drawing/2014/main" id="{EFF84D9E-9B7F-5047-570D-05F28F9A3D8C}"/>
-              </a:ext>
-            </a:extLst>
-          </p:cNvPr>
-          <p:cNvSpPr txBox="1"/>
-          <p:nvPr/>
-        </p:nvSpPr>
-        <p:spPr>
-          <a:xfrm>
-            <a:off x="10014317" y="690840"/>
-            <a:ext cx="1990197" cy="646331"/>
-          </a:xfrm>
-          <a:prstGeom prst="rect">
-            <a:avLst/>
-          </a:prstGeom>
-          <a:solidFill>
-            <a:schemeClr val="accent6">
-              <a:lumMod val="20000"/>
-              <a:lumOff val="80000"/>
-            </a:schemeClr>
-          </a:solidFill>
-          <a:ln w="38100">
-            <a:solidFill>
-              <a:schemeClr val="accent1">
-                <a:lumMod val="60000"/>
-                <a:lumOff val="40000"/>
-              </a:schemeClr>
-            </a:solidFill>
-          </a:ln>
-        </p:spPr>
-        <p:txBody>
-          <a:bodyPr wrap="square" rtlCol="0">
-            <a:spAutoFit/>
-          </a:bodyPr>
-          <a:lstStyle/>
-          <a:p>
-            <a:r>
-              <a:rPr lang="en-US" b="1" dirty="0">
-                <a:solidFill>
-                  <a:schemeClr val="tx2"/>
-                </a:solidFill>
-              </a:rPr>
-              <a:t>Surender</a:t>
-            </a:r>
-          </a:p>
-          <a:p>
-            <a:endParaRPr lang="en-US" dirty="0"/>
-          </a:p>
-        </p:txBody>
-      </p:sp>
-      <p:pic>
-        <p:nvPicPr>
-          <p:cNvPr id="4" name="Picture 3" descr="A screenshot of a computer program&#10;&#10;Description automatically generated">
-            <a:extLst>
-              <a:ext uri="{FF2B5EF4-FFF2-40B4-BE49-F238E27FC236}">
-                <a16:creationId xmlns:a16="http://schemas.microsoft.com/office/drawing/2014/main" id="{F4885D69-FFA1-AA4E-A088-A7AFEAB533A3}"/>
-              </a:ext>
-            </a:extLst>
-          </p:cNvPr>
-          <p:cNvPicPr>
-            <a:picLocks noChangeAspect="1"/>
-          </p:cNvPicPr>
-          <p:nvPr/>
-        </p:nvPicPr>
-        <p:blipFill>
-          <a:blip r:embed="rId2">
-            <a:extLst>
-              <a:ext uri="{28A0092B-C50C-407E-A947-70E740481C1C}">
-                <a14:useLocalDpi xmlns:a14="http://schemas.microsoft.com/office/drawing/2010/main" val="0"/>
-              </a:ext>
-            </a:extLst>
-          </a:blip>
-          <a:stretch>
-            <a:fillRect/>
-          </a:stretch>
-        </p:blipFill>
-        <p:spPr>
-          <a:xfrm>
-            <a:off x="1460066" y="1739188"/>
-            <a:ext cx="7799599" cy="4284789"/>
-          </a:xfrm>
-          <a:prstGeom prst="rect">
-            <a:avLst/>
-          </a:prstGeom>
-        </p:spPr>
-      </p:pic>
-    </p:spTree>
-    <p:extLst>
-      <p:ext uri="{BB962C8B-B14F-4D97-AF65-F5344CB8AC3E}">
-        <p14:creationId xmlns:p14="http://schemas.microsoft.com/office/powerpoint/2010/main" val="3628486274"/>
-      </p:ext>
-    </p:extLst>
-  </p:cSld>
-  <p:clrMapOvr>
-    <a:masterClrMapping/>
-  </p:clrMapOvr>
-</p:sld>
-</file>
-
-<file path=ppt/slides/slide12.xml><?xml version="1.0" encoding="utf-8"?>
-<p:sld xmlns:a="http://schemas.openxmlformats.org/drawingml/2006/main" xmlns:r="http://schemas.openxmlformats.org/officeDocument/2006/relationships" xmlns:p="http://schemas.openxmlformats.org/presentationml/2006/main">
-  <p:cSld>
-    <p:bg>
-      <p:bgPr>
-        <a:solidFill>
-          <a:schemeClr val="bg1"/>
-        </a:solidFill>
-        <a:effectLst/>
-      </p:bgPr>
-    </p:bg>
-    <p:spTree>
-      <p:nvGrpSpPr>
-        <p:cNvPr id="1" name=""/>
-        <p:cNvGrpSpPr/>
-        <p:nvPr/>
-      </p:nvGrpSpPr>
-      <p:grpSpPr>
-        <a:xfrm>
-          <a:off x="0" y="0"/>
-          <a:ext cx="0" cy="0"/>
-          <a:chOff x="0" y="0"/>
-          <a:chExt cx="0" cy="0"/>
-        </a:xfrm>
-      </p:grpSpPr>
-      <p:sp useBgFill="1">
-        <p:nvSpPr>
-          <p:cNvPr id="28" name="Rectangle 27">
-            <a:extLst>
-              <a:ext uri="{FF2B5EF4-FFF2-40B4-BE49-F238E27FC236}">
-                <a16:creationId xmlns:a16="http://schemas.microsoft.com/office/drawing/2014/main" id="{43C823D3-D619-407C-89E0-C6F6B1E7A42A}"/>
-              </a:ext>
-              <a:ext uri="{C183D7F6-B498-43B3-948B-1728B52AA6E4}">
-                <adec:decorative xmlns:adec="http://schemas.microsoft.com/office/drawing/2017/decorative" val="1"/>
-              </a:ext>
-            </a:extLst>
-          </p:cNvPr>
-          <p:cNvSpPr>
-            <a:spLocks noGrp="1" noRot="1" noChangeAspect="1" noMove="1" noResize="1" noEditPoints="1" noAdjustHandles="1" noChangeArrowheads="1" noChangeShapeType="1" noTextEdit="1"/>
-          </p:cNvSpPr>
-          <p:nvPr>
-            <p:extLst>
-              <p:ext uri="{386F3935-93C4-4BCD-93E2-E3B085C9AB24}">
-                <p16:designElem xmlns:p16="http://schemas.microsoft.com/office/powerpoint/2015/main" val="1"/>
-              </p:ext>
-            </p:extLst>
-          </p:nvPr>
-        </p:nvSpPr>
-        <p:spPr>
-          <a:xfrm>
-            <a:off x="0" y="1"/>
-            <a:ext cx="12191695" cy="6858000"/>
-          </a:xfrm>
-          <a:prstGeom prst="rect">
-            <a:avLst/>
-          </a:prstGeom>
-          <a:ln>
-            <a:noFill/>
-          </a:ln>
-        </p:spPr>
-        <p:style>
-          <a:lnRef idx="2">
-            <a:schemeClr val="accent1">
-              <a:shade val="50000"/>
-            </a:schemeClr>
-          </a:lnRef>
-          <a:fillRef idx="1">
-            <a:schemeClr val="accent1"/>
-          </a:fillRef>
-          <a:effectRef idx="0">
-            <a:schemeClr val="accent1"/>
-          </a:effectRef>
-          <a:fontRef idx="minor">
-            <a:schemeClr val="lt1"/>
-          </a:fontRef>
-        </p:style>
-        <p:txBody>
-          <a:bodyPr rtlCol="0" anchor="ctr"/>
-          <a:lstStyle/>
-          <a:p>
-            <a:pPr algn="ctr"/>
-            <a:endParaRPr lang="en-US"/>
-          </a:p>
-        </p:txBody>
-      </p:sp>
-      <p:sp>
-        <p:nvSpPr>
-          <p:cNvPr id="30" name="Rectangle 29">
-            <a:extLst>
-              <a:ext uri="{FF2B5EF4-FFF2-40B4-BE49-F238E27FC236}">
-                <a16:creationId xmlns:a16="http://schemas.microsoft.com/office/drawing/2014/main" id="{047F8E3E-2FFA-4A0F-B3C7-E57ADDCFB415}"/>
-              </a:ext>
-              <a:ext uri="{C183D7F6-B498-43B3-948B-1728B52AA6E4}">
-                <adec:decorative xmlns:adec="http://schemas.microsoft.com/office/drawing/2017/decorative" val="1"/>
-              </a:ext>
-            </a:extLst>
-          </p:cNvPr>
-          <p:cNvSpPr>
-            <a:spLocks noGrp="1" noRot="1" noChangeAspect="1" noMove="1" noResize="1" noEditPoints="1" noAdjustHandles="1" noChangeArrowheads="1" noChangeShapeType="1" noTextEdit="1"/>
-          </p:cNvSpPr>
-          <p:nvPr>
-            <p:extLst>
-              <p:ext uri="{386F3935-93C4-4BCD-93E2-E3B085C9AB24}">
-                <p16:designElem xmlns:p16="http://schemas.microsoft.com/office/powerpoint/2015/main" val="1"/>
-              </p:ext>
-            </p:extLst>
-          </p:nvPr>
-        </p:nvSpPr>
-        <p:spPr>
-          <a:xfrm>
-            <a:off x="305" y="0"/>
-            <a:ext cx="12191695" cy="6858000"/>
-          </a:xfrm>
-          <a:prstGeom prst="rect">
-            <a:avLst/>
-          </a:prstGeom>
-          <a:solidFill>
-            <a:schemeClr val="bg1"/>
-          </a:solidFill>
-          <a:ln>
-            <a:noFill/>
-          </a:ln>
-        </p:spPr>
-        <p:style>
-          <a:lnRef idx="2">
-            <a:schemeClr val="accent1">
-              <a:shade val="50000"/>
-            </a:schemeClr>
-          </a:lnRef>
-          <a:fillRef idx="1">
-            <a:schemeClr val="accent1"/>
-          </a:fillRef>
-          <a:effectRef idx="0">
-            <a:schemeClr val="accent1"/>
-          </a:effectRef>
-          <a:fontRef idx="minor">
-            <a:schemeClr val="lt1"/>
-          </a:fontRef>
-        </p:style>
-        <p:txBody>
-          <a:bodyPr rtlCol="0" anchor="ctr"/>
-          <a:lstStyle/>
-          <a:p>
-            <a:pPr algn="ctr"/>
-            <a:endParaRPr lang="en-US" sz="800"/>
-          </a:p>
-        </p:txBody>
-      </p:sp>
-      <p:sp>
-        <p:nvSpPr>
-          <p:cNvPr id="2" name="Title 1">
-            <a:extLst>
-              <a:ext uri="{FF2B5EF4-FFF2-40B4-BE49-F238E27FC236}">
-                <a16:creationId xmlns:a16="http://schemas.microsoft.com/office/drawing/2014/main" id="{92F8AC2F-1D97-02E3-0667-5584CC7EC063}"/>
-              </a:ext>
-            </a:extLst>
-          </p:cNvPr>
-          <p:cNvSpPr>
-            <a:spLocks noGrp="1"/>
-          </p:cNvSpPr>
-          <p:nvPr>
-            <p:ph type="title"/>
-          </p:nvPr>
-        </p:nvSpPr>
-        <p:spPr>
-          <a:xfrm>
-            <a:off x="1012971" y="164105"/>
-            <a:ext cx="9833548" cy="741060"/>
-          </a:xfrm>
-        </p:spPr>
-        <p:txBody>
-          <a:bodyPr anchor="b">
-            <a:normAutofit/>
-          </a:bodyPr>
-          <a:lstStyle/>
-          <a:p>
-            <a:pPr algn="ctr"/>
-            <a:r>
-              <a:rPr lang="en-US" sz="3600" dirty="0">
-                <a:solidFill>
-                  <a:schemeClr val="tx2"/>
-                </a:solidFill>
-              </a:rPr>
-              <a:t>ML Model</a:t>
-            </a:r>
-          </a:p>
-        </p:txBody>
-      </p:sp>
-      <p:grpSp>
-        <p:nvGrpSpPr>
-          <p:cNvPr id="32" name="Group 31">
-            <a:extLst>
-              <a:ext uri="{FF2B5EF4-FFF2-40B4-BE49-F238E27FC236}">
-                <a16:creationId xmlns:a16="http://schemas.microsoft.com/office/drawing/2014/main" id="{33D939F1-7ABE-4D0E-946A-43F37F556AFD}"/>
-              </a:ext>
-              <a:ext uri="{C183D7F6-B498-43B3-948B-1728B52AA6E4}">
-                <adec:decorative xmlns:adec="http://schemas.microsoft.com/office/drawing/2017/decorative" val="1"/>
-              </a:ext>
-            </a:extLst>
-          </p:cNvPr>
-          <p:cNvGrpSpPr>
-            <a:grpSpLocks noGrp="1" noUngrp="1" noRot="1" noChangeAspect="1" noMove="1" noResize="1"/>
-          </p:cNvGrpSpPr>
-          <p:nvPr>
-            <p:extLst>
-              <p:ext uri="{386F3935-93C4-4BCD-93E2-E3B085C9AB24}">
-                <p16:designElem xmlns:p16="http://schemas.microsoft.com/office/powerpoint/2015/main" val="1"/>
-              </p:ext>
-            </p:extLst>
-          </p:nvPr>
-        </p:nvGrpSpPr>
-        <p:grpSpPr>
-          <a:xfrm>
-            <a:off x="0" y="0"/>
-            <a:ext cx="3346102" cy="2510865"/>
-            <a:chOff x="-305" y="-1"/>
-            <a:chExt cx="3832880" cy="2876136"/>
-          </a:xfrm>
-        </p:grpSpPr>
-        <p:sp>
-          <p:nvSpPr>
-            <p:cNvPr id="33" name="Freeform: Shape 32">
-              <a:extLst>
-                <a:ext uri="{FF2B5EF4-FFF2-40B4-BE49-F238E27FC236}">
-                  <a16:creationId xmlns:a16="http://schemas.microsoft.com/office/drawing/2014/main" id="{63FE0426-0FE4-451E-A8BB-08DA6A6AC200}"/>
-                </a:ext>
-                <a:ext uri="{C183D7F6-B498-43B3-948B-1728B52AA6E4}">
-                  <adec:decorative xmlns:adec="http://schemas.microsoft.com/office/drawing/2017/decorative" val="1"/>
-                </a:ext>
-              </a:extLst>
-            </p:cNvPr>
-            <p:cNvSpPr/>
-            <p:nvPr>
-              <p:extLst>
-                <p:ext uri="{386F3935-93C4-4BCD-93E2-E3B085C9AB24}">
-                  <p16:designElem xmlns:p16="http://schemas.microsoft.com/office/powerpoint/2015/main" val="1"/>
-                </p:ext>
-              </p:extLst>
-            </p:nvPr>
-          </p:nvSpPr>
-          <p:spPr>
-            <a:xfrm>
-              <a:off x="305" y="1"/>
-              <a:ext cx="3815424" cy="2653659"/>
-            </a:xfrm>
-            <a:custGeom>
-              <a:avLst/>
-              <a:gdLst>
-                <a:gd name="connsiteX0" fmla="*/ 3203055 w 3815424"/>
-                <a:gd name="connsiteY0" fmla="*/ 0 h 2653659"/>
-                <a:gd name="connsiteX1" fmla="*/ 3815424 w 3815424"/>
-                <a:gd name="connsiteY1" fmla="*/ 0 h 2653659"/>
-                <a:gd name="connsiteX2" fmla="*/ 3801025 w 3815424"/>
-                <a:gd name="connsiteY2" fmla="*/ 214243 h 2653659"/>
-                <a:gd name="connsiteX3" fmla="*/ 587142 w 3815424"/>
-                <a:gd name="connsiteY3" fmla="*/ 2653659 h 2653659"/>
-                <a:gd name="connsiteX4" fmla="*/ 53389 w 3815424"/>
-                <a:gd name="connsiteY4" fmla="*/ 2605041 h 2653659"/>
-                <a:gd name="connsiteX5" fmla="*/ 0 w 3815424"/>
-                <a:gd name="connsiteY5" fmla="*/ 2593136 h 2653659"/>
-                <a:gd name="connsiteX6" fmla="*/ 0 w 3815424"/>
-                <a:gd name="connsiteY6" fmla="*/ 1994836 h 2653659"/>
-                <a:gd name="connsiteX7" fmla="*/ 159710 w 3815424"/>
-                <a:gd name="connsiteY7" fmla="*/ 2035054 h 2653659"/>
-                <a:gd name="connsiteX8" fmla="*/ 587142 w 3815424"/>
-                <a:gd name="connsiteY8" fmla="*/ 2075152 h 2653659"/>
-                <a:gd name="connsiteX9" fmla="*/ 1549283 w 3815424"/>
-                <a:gd name="connsiteY9" fmla="*/ 1900153 h 2653659"/>
-                <a:gd name="connsiteX10" fmla="*/ 2406698 w 3815424"/>
-                <a:gd name="connsiteY10" fmla="*/ 1418450 h 2653659"/>
-                <a:gd name="connsiteX11" fmla="*/ 2996069 w 3815424"/>
-                <a:gd name="connsiteY11" fmla="*/ 728678 h 2653659"/>
-                <a:gd name="connsiteX12" fmla="*/ 3193967 w 3815424"/>
-                <a:gd name="connsiteY12" fmla="*/ 137719 h 2653659"/>
-              </a:gdLst>
-              <a:ahLst/>
-              <a:cxnLst>
-                <a:cxn ang="0">
-                  <a:pos x="connsiteX0" y="connsiteY0"/>
-                </a:cxn>
-                <a:cxn ang="0">
-                  <a:pos x="connsiteX1" y="connsiteY1"/>
-                </a:cxn>
-                <a:cxn ang="0">
-                  <a:pos x="connsiteX2" y="connsiteY2"/>
-                </a:cxn>
-                <a:cxn ang="0">
-                  <a:pos x="connsiteX3" y="connsiteY3"/>
-                </a:cxn>
-                <a:cxn ang="0">
-                  <a:pos x="connsiteX4" y="connsiteY4"/>
-                </a:cxn>
-                <a:cxn ang="0">
-                  <a:pos x="connsiteX5" y="connsiteY5"/>
-                </a:cxn>
-                <a:cxn ang="0">
-                  <a:pos x="connsiteX6" y="connsiteY6"/>
-                </a:cxn>
-                <a:cxn ang="0">
-                  <a:pos x="connsiteX7" y="connsiteY7"/>
-                </a:cxn>
-                <a:cxn ang="0">
-                  <a:pos x="connsiteX8" y="connsiteY8"/>
-                </a:cxn>
-                <a:cxn ang="0">
-                  <a:pos x="connsiteX9" y="connsiteY9"/>
-                </a:cxn>
-                <a:cxn ang="0">
-                  <a:pos x="connsiteX10" y="connsiteY10"/>
-                </a:cxn>
-                <a:cxn ang="0">
-                  <a:pos x="connsiteX11" y="connsiteY11"/>
-                </a:cxn>
-                <a:cxn ang="0">
-                  <a:pos x="connsiteX12" y="connsiteY12"/>
-                </a:cxn>
-              </a:cxnLst>
-              <a:rect l="l" t="t" r="r" b="b"/>
-              <a:pathLst>
-                <a:path w="3815424" h="2653659">
-                  <a:moveTo>
-                    <a:pt x="3203055" y="0"/>
-                  </a:moveTo>
-                  <a:lnTo>
-                    <a:pt x="3815424" y="0"/>
-                  </a:lnTo>
-                  <a:lnTo>
-                    <a:pt x="3801025" y="214243"/>
-                  </a:lnTo>
-                  <a:cubicBezTo>
-                    <a:pt x="3616317" y="1584467"/>
-                    <a:pt x="2091637" y="2653659"/>
-                    <a:pt x="587142" y="2653659"/>
-                  </a:cubicBezTo>
-                  <a:cubicBezTo>
-                    <a:pt x="400192" y="2653659"/>
-                    <a:pt x="222112" y="2636953"/>
-                    <a:pt x="53389" y="2605041"/>
-                  </a:cubicBezTo>
-                  <a:lnTo>
-                    <a:pt x="0" y="2593136"/>
-                  </a:lnTo>
-                  <a:lnTo>
-                    <a:pt x="0" y="1994836"/>
-                  </a:lnTo>
-                  <a:lnTo>
-                    <a:pt x="159710" y="2035054"/>
-                  </a:lnTo>
-                  <a:cubicBezTo>
-                    <a:pt x="295467" y="2061726"/>
-                    <a:pt x="438268" y="2075152"/>
-                    <a:pt x="587142" y="2075152"/>
-                  </a:cubicBezTo>
-                  <a:cubicBezTo>
-                    <a:pt x="901731" y="2075152"/>
-                    <a:pt x="1234490" y="2014697"/>
-                    <a:pt x="1549283" y="1900153"/>
-                  </a:cubicBezTo>
-                  <a:cubicBezTo>
-                    <a:pt x="1860709" y="1786959"/>
-                    <a:pt x="2157231" y="1620350"/>
-                    <a:pt x="2406698" y="1418450"/>
-                  </a:cubicBezTo>
-                  <a:cubicBezTo>
-                    <a:pt x="2655859" y="1216840"/>
-                    <a:pt x="2859596" y="978302"/>
-                    <a:pt x="2996069" y="728678"/>
-                  </a:cubicBezTo>
-                  <a:cubicBezTo>
-                    <a:pt x="3101178" y="536396"/>
-                    <a:pt x="3167417" y="338366"/>
-                    <a:pt x="3193967" y="137719"/>
-                  </a:cubicBezTo>
-                  <a:close/>
-                </a:path>
-              </a:pathLst>
-            </a:custGeom>
-            <a:gradFill>
-              <a:gsLst>
-                <a:gs pos="2000">
-                  <a:schemeClr val="bg1">
-                    <a:alpha val="10000"/>
-                  </a:schemeClr>
-                </a:gs>
-                <a:gs pos="16000">
-                  <a:schemeClr val="accent6">
-                    <a:alpha val="10000"/>
-                  </a:schemeClr>
-                </a:gs>
-                <a:gs pos="100000">
-                  <a:schemeClr val="bg1">
-                    <a:alpha val="10000"/>
-                  </a:schemeClr>
-                </a:gs>
-                <a:gs pos="85000">
-                  <a:schemeClr val="accent1">
-                    <a:alpha val="10000"/>
-                  </a:schemeClr>
-                </a:gs>
-              </a:gsLst>
-              <a:lin ang="12000000" scaled="0"/>
-            </a:gradFill>
-            <a:ln>
-              <a:noFill/>
-            </a:ln>
-          </p:spPr>
-          <p:style>
-            <a:lnRef idx="2">
-              <a:schemeClr val="accent1">
-                <a:shade val="50000"/>
-              </a:schemeClr>
-            </a:lnRef>
-            <a:fillRef idx="1">
-              <a:schemeClr val="accent1"/>
-            </a:fillRef>
-            <a:effectRef idx="0">
-              <a:schemeClr val="accent1"/>
-            </a:effectRef>
-            <a:fontRef idx="minor">
-              <a:schemeClr val="lt1"/>
-            </a:fontRef>
-          </p:style>
-          <p:txBody>
-            <a:bodyPr rtlCol="0" anchor="ctr"/>
-            <a:lstStyle/>
-            <a:p>
-              <a:pPr algn="ctr"/>
-              <a:endParaRPr lang="en-US"/>
-            </a:p>
-          </p:txBody>
-        </p:sp>
-        <p:sp>
-          <p:nvSpPr>
-            <p:cNvPr id="34" name="Freeform: Shape 33">
-              <a:extLst>
-                <a:ext uri="{FF2B5EF4-FFF2-40B4-BE49-F238E27FC236}">
-                  <a16:creationId xmlns:a16="http://schemas.microsoft.com/office/drawing/2014/main" id="{4A32F7E8-35B4-451F-AA07-AECF7CA1D532}"/>
-                </a:ext>
-                <a:ext uri="{C183D7F6-B498-43B3-948B-1728B52AA6E4}">
-                  <adec:decorative xmlns:adec="http://schemas.microsoft.com/office/drawing/2017/decorative" val="1"/>
-                </a:ext>
-              </a:extLst>
-            </p:cNvPr>
-            <p:cNvSpPr/>
-            <p:nvPr>
-              <p:extLst>
-                <p:ext uri="{386F3935-93C4-4BCD-93E2-E3B085C9AB24}">
-                  <p16:designElem xmlns:p16="http://schemas.microsoft.com/office/powerpoint/2015/main" val="1"/>
-                </p:ext>
-              </p:extLst>
-            </p:nvPr>
-          </p:nvSpPr>
-          <p:spPr>
-            <a:xfrm>
-              <a:off x="305" y="-1"/>
-              <a:ext cx="3815424" cy="2653660"/>
-            </a:xfrm>
-            <a:custGeom>
-              <a:avLst/>
-              <a:gdLst>
-                <a:gd name="connsiteX0" fmla="*/ 3305038 w 3815424"/>
-                <a:gd name="connsiteY0" fmla="*/ 0 h 2653660"/>
-                <a:gd name="connsiteX1" fmla="*/ 3815424 w 3815424"/>
-                <a:gd name="connsiteY1" fmla="*/ 0 h 2653660"/>
-                <a:gd name="connsiteX2" fmla="*/ 3801025 w 3815424"/>
-                <a:gd name="connsiteY2" fmla="*/ 214244 h 2653660"/>
-                <a:gd name="connsiteX3" fmla="*/ 587142 w 3815424"/>
-                <a:gd name="connsiteY3" fmla="*/ 2653660 h 2653660"/>
-                <a:gd name="connsiteX4" fmla="*/ 53389 w 3815424"/>
-                <a:gd name="connsiteY4" fmla="*/ 2605042 h 2653660"/>
-                <a:gd name="connsiteX5" fmla="*/ 0 w 3815424"/>
-                <a:gd name="connsiteY5" fmla="*/ 2593137 h 2653660"/>
-                <a:gd name="connsiteX6" fmla="*/ 0 w 3815424"/>
-                <a:gd name="connsiteY6" fmla="*/ 2094444 h 2653660"/>
-                <a:gd name="connsiteX7" fmla="*/ 137675 w 3815424"/>
-                <a:gd name="connsiteY7" fmla="*/ 2129195 h 2653660"/>
-                <a:gd name="connsiteX8" fmla="*/ 587142 w 3815424"/>
-                <a:gd name="connsiteY8" fmla="*/ 2171571 h 2653660"/>
-                <a:gd name="connsiteX9" fmla="*/ 1585826 w 3815424"/>
-                <a:gd name="connsiteY9" fmla="*/ 1990112 h 2653660"/>
-                <a:gd name="connsiteX10" fmla="*/ 2473046 w 3815424"/>
-                <a:gd name="connsiteY10" fmla="*/ 1491633 h 2653660"/>
-                <a:gd name="connsiteX11" fmla="*/ 3086710 w 3815424"/>
-                <a:gd name="connsiteY11" fmla="*/ 772838 h 2653660"/>
-                <a:gd name="connsiteX12" fmla="*/ 3295217 w 3815424"/>
-                <a:gd name="connsiteY12" fmla="*/ 149229 h 2653660"/>
-              </a:gdLst>
-              <a:ahLst/>
-              <a:cxnLst>
-                <a:cxn ang="0">
-                  <a:pos x="connsiteX0" y="connsiteY0"/>
-                </a:cxn>
-                <a:cxn ang="0">
-                  <a:pos x="connsiteX1" y="connsiteY1"/>
-                </a:cxn>
-                <a:cxn ang="0">
-                  <a:pos x="connsiteX2" y="connsiteY2"/>
-                </a:cxn>
-                <a:cxn ang="0">
-                  <a:pos x="connsiteX3" y="connsiteY3"/>
-                </a:cxn>
-                <a:cxn ang="0">
-                  <a:pos x="connsiteX4" y="connsiteY4"/>
-                </a:cxn>
-                <a:cxn ang="0">
-                  <a:pos x="connsiteX5" y="connsiteY5"/>
-                </a:cxn>
-                <a:cxn ang="0">
-                  <a:pos x="connsiteX6" y="connsiteY6"/>
-                </a:cxn>
-                <a:cxn ang="0">
-                  <a:pos x="connsiteX7" y="connsiteY7"/>
-                </a:cxn>
-                <a:cxn ang="0">
-                  <a:pos x="connsiteX8" y="connsiteY8"/>
-                </a:cxn>
-                <a:cxn ang="0">
-                  <a:pos x="connsiteX9" y="connsiteY9"/>
-                </a:cxn>
-                <a:cxn ang="0">
-                  <a:pos x="connsiteX10" y="connsiteY10"/>
-                </a:cxn>
-                <a:cxn ang="0">
-                  <a:pos x="connsiteX11" y="connsiteY11"/>
-                </a:cxn>
-                <a:cxn ang="0">
-                  <a:pos x="connsiteX12" y="connsiteY12"/>
-                </a:cxn>
-              </a:cxnLst>
-              <a:rect l="l" t="t" r="r" b="b"/>
-              <a:pathLst>
-                <a:path w="3815424" h="2653660">
-                  <a:moveTo>
-                    <a:pt x="3305038" y="0"/>
-                  </a:moveTo>
-                  <a:lnTo>
-                    <a:pt x="3815424" y="0"/>
-                  </a:lnTo>
-                  <a:lnTo>
-                    <a:pt x="3801025" y="214244"/>
-                  </a:lnTo>
-                  <a:cubicBezTo>
-                    <a:pt x="3616317" y="1584467"/>
-                    <a:pt x="2091637" y="2653660"/>
-                    <a:pt x="587142" y="2653660"/>
-                  </a:cubicBezTo>
-                  <a:cubicBezTo>
-                    <a:pt x="400192" y="2653660"/>
-                    <a:pt x="222112" y="2636954"/>
-                    <a:pt x="53389" y="2605042"/>
-                  </a:cubicBezTo>
-                  <a:lnTo>
-                    <a:pt x="0" y="2593137"/>
-                  </a:lnTo>
-                  <a:lnTo>
-                    <a:pt x="0" y="2094444"/>
-                  </a:lnTo>
-                  <a:lnTo>
-                    <a:pt x="137675" y="2129195"/>
-                  </a:lnTo>
-                  <a:cubicBezTo>
-                    <a:pt x="280616" y="2157374"/>
-                    <a:pt x="430766" y="2171571"/>
-                    <a:pt x="587142" y="2171571"/>
-                  </a:cubicBezTo>
-                  <a:cubicBezTo>
-                    <a:pt x="918879" y="2171571"/>
-                    <a:pt x="1254904" y="2110634"/>
-                    <a:pt x="1585826" y="1990112"/>
-                  </a:cubicBezTo>
-                  <a:cubicBezTo>
-                    <a:pt x="1908071" y="1873061"/>
-                    <a:pt x="2214800" y="1700666"/>
-                    <a:pt x="2473046" y="1491633"/>
-                  </a:cubicBezTo>
-                  <a:cubicBezTo>
-                    <a:pt x="2735782" y="1279031"/>
-                    <a:pt x="2942276" y="1037118"/>
-                    <a:pt x="3086710" y="772838"/>
-                  </a:cubicBezTo>
-                  <a:cubicBezTo>
-                    <a:pt x="3197408" y="570216"/>
-                    <a:pt x="3267226" y="361248"/>
-                    <a:pt x="3295217" y="149229"/>
-                  </a:cubicBezTo>
-                  <a:close/>
-                </a:path>
-              </a:pathLst>
-            </a:custGeom>
-            <a:gradFill>
-              <a:gsLst>
-                <a:gs pos="2000">
-                  <a:schemeClr val="bg1">
-                    <a:alpha val="10000"/>
-                  </a:schemeClr>
-                </a:gs>
-                <a:gs pos="16000">
-                  <a:schemeClr val="accent6">
-                    <a:alpha val="10000"/>
-                  </a:schemeClr>
-                </a:gs>
-                <a:gs pos="100000">
-                  <a:schemeClr val="bg1">
-                    <a:alpha val="10000"/>
-                  </a:schemeClr>
-                </a:gs>
-                <a:gs pos="85000">
-                  <a:schemeClr val="accent1">
-                    <a:alpha val="10000"/>
-                  </a:schemeClr>
-                </a:gs>
-              </a:gsLst>
-              <a:lin ang="12000000" scaled="0"/>
-            </a:gradFill>
-            <a:ln>
-              <a:noFill/>
-            </a:ln>
-          </p:spPr>
-          <p:style>
-            <a:lnRef idx="2">
-              <a:schemeClr val="accent1">
-                <a:shade val="50000"/>
-              </a:schemeClr>
-            </a:lnRef>
-            <a:fillRef idx="1">
-              <a:schemeClr val="accent1"/>
-            </a:fillRef>
-            <a:effectRef idx="0">
-              <a:schemeClr val="accent1"/>
-            </a:effectRef>
-            <a:fontRef idx="minor">
-              <a:schemeClr val="lt1"/>
-            </a:fontRef>
-          </p:style>
-          <p:txBody>
-            <a:bodyPr rtlCol="0" anchor="ctr"/>
-            <a:lstStyle/>
-            <a:p>
-              <a:pPr algn="ctr"/>
-              <a:endParaRPr lang="en-US"/>
-            </a:p>
-          </p:txBody>
-        </p:sp>
-        <p:sp>
-          <p:nvSpPr>
-            <p:cNvPr id="35" name="Freeform: Shape 34">
-              <a:extLst>
-                <a:ext uri="{FF2B5EF4-FFF2-40B4-BE49-F238E27FC236}">
-                  <a16:creationId xmlns:a16="http://schemas.microsoft.com/office/drawing/2014/main" id="{E1097796-C3C8-4772-9EBD-9F5CA368F5A2}"/>
-                </a:ext>
-                <a:ext uri="{C183D7F6-B498-43B3-948B-1728B52AA6E4}">
-                  <adec:decorative xmlns:adec="http://schemas.microsoft.com/office/drawing/2017/decorative" val="1"/>
-                </a:ext>
-              </a:extLst>
-            </p:cNvPr>
-            <p:cNvSpPr/>
-            <p:nvPr>
-              <p:extLst>
-                <p:ext uri="{386F3935-93C4-4BCD-93E2-E3B085C9AB24}">
-                  <p16:designElem xmlns:p16="http://schemas.microsoft.com/office/powerpoint/2015/main" val="1"/>
-                </p:ext>
-              </p:extLst>
-            </p:nvPr>
-          </p:nvSpPr>
-          <p:spPr>
-            <a:xfrm>
-              <a:off x="-305" y="1"/>
-              <a:ext cx="3815986" cy="2675935"/>
-            </a:xfrm>
-            <a:custGeom>
-              <a:avLst/>
-              <a:gdLst>
-                <a:gd name="connsiteX0" fmla="*/ 3648768 w 3815986"/>
-                <a:gd name="connsiteY0" fmla="*/ 0 h 2675935"/>
-                <a:gd name="connsiteX1" fmla="*/ 3815986 w 3815986"/>
-                <a:gd name="connsiteY1" fmla="*/ 0 h 2675935"/>
-                <a:gd name="connsiteX2" fmla="*/ 3804695 w 3815986"/>
-                <a:gd name="connsiteY2" fmla="*/ 200084 h 2675935"/>
-                <a:gd name="connsiteX3" fmla="*/ 3762590 w 3815986"/>
-                <a:gd name="connsiteY3" fmla="*/ 455543 h 2675935"/>
-                <a:gd name="connsiteX4" fmla="*/ 3592332 w 3815986"/>
-                <a:gd name="connsiteY4" fmla="*/ 947274 h 2675935"/>
-                <a:gd name="connsiteX5" fmla="*/ 2953967 w 3815986"/>
-                <a:gd name="connsiteY5" fmla="*/ 1782349 h 2675935"/>
-                <a:gd name="connsiteX6" fmla="*/ 2530669 w 3815986"/>
-                <a:gd name="connsiteY6" fmla="*/ 2109494 h 2675935"/>
-                <a:gd name="connsiteX7" fmla="*/ 2057561 w 3815986"/>
-                <a:gd name="connsiteY7" fmla="*/ 2369245 h 2675935"/>
-                <a:gd name="connsiteX8" fmla="*/ 1007330 w 3815986"/>
-                <a:gd name="connsiteY8" fmla="*/ 2655701 h 2675935"/>
-                <a:gd name="connsiteX9" fmla="*/ 732765 w 3815986"/>
-                <a:gd name="connsiteY9" fmla="*/ 2674696 h 2675935"/>
-                <a:gd name="connsiteX10" fmla="*/ 457666 w 3815986"/>
-                <a:gd name="connsiteY10" fmla="*/ 2670839 h 2675935"/>
-                <a:gd name="connsiteX11" fmla="*/ 183574 w 3815986"/>
-                <a:gd name="connsiteY11" fmla="*/ 2643312 h 2675935"/>
-                <a:gd name="connsiteX12" fmla="*/ 0 w 3815986"/>
-                <a:gd name="connsiteY12" fmla="*/ 2607798 h 2675935"/>
-                <a:gd name="connsiteX13" fmla="*/ 0 w 3815986"/>
-                <a:gd name="connsiteY13" fmla="*/ 2356652 h 2675935"/>
-                <a:gd name="connsiteX14" fmla="*/ 222195 w 3815986"/>
-                <a:gd name="connsiteY14" fmla="*/ 2396940 h 2675935"/>
-                <a:gd name="connsiteX15" fmla="*/ 472364 w 3815986"/>
-                <a:gd name="connsiteY15" fmla="*/ 2419092 h 2675935"/>
-                <a:gd name="connsiteX16" fmla="*/ 974972 w 3815986"/>
-                <a:gd name="connsiteY16" fmla="*/ 2402122 h 2675935"/>
-                <a:gd name="connsiteX17" fmla="*/ 1468292 w 3815986"/>
-                <a:gd name="connsiteY17" fmla="*/ 2304162 h 2675935"/>
-                <a:gd name="connsiteX18" fmla="*/ 1940176 w 3815986"/>
-                <a:gd name="connsiteY18" fmla="*/ 2133695 h 2675935"/>
-                <a:gd name="connsiteX19" fmla="*/ 2783403 w 3815986"/>
-                <a:gd name="connsiteY19" fmla="*/ 1609954 h 2675935"/>
-                <a:gd name="connsiteX20" fmla="*/ 3128104 w 3815986"/>
-                <a:gd name="connsiteY20" fmla="*/ 1260439 h 2675935"/>
-                <a:gd name="connsiteX21" fmla="*/ 3400639 w 3815986"/>
-                <a:gd name="connsiteY21" fmla="*/ 859052 h 2675935"/>
-                <a:gd name="connsiteX22" fmla="*/ 3585595 w 3815986"/>
-                <a:gd name="connsiteY22" fmla="*/ 415336 h 2675935"/>
-                <a:gd name="connsiteX23" fmla="*/ 3635918 w 3815986"/>
-                <a:gd name="connsiteY23" fmla="*/ 181137 h 2675935"/>
-              </a:gdLst>
-              <a:ahLst/>
-              <a:cxnLst>
-                <a:cxn ang="0">
-                  <a:pos x="connsiteX0" y="connsiteY0"/>
-                </a:cxn>
-                <a:cxn ang="0">
-                  <a:pos x="connsiteX1" y="connsiteY1"/>
-                </a:cxn>
-                <a:cxn ang="0">
-                  <a:pos x="connsiteX2" y="connsiteY2"/>
-                </a:cxn>
-                <a:cxn ang="0">
-                  <a:pos x="connsiteX3" y="connsiteY3"/>
-                </a:cxn>
-                <a:cxn ang="0">
-                  <a:pos x="connsiteX4" y="connsiteY4"/>
-                </a:cxn>
-                <a:cxn ang="0">
-                  <a:pos x="connsiteX5" y="connsiteY5"/>
-                </a:cxn>
-                <a:cxn ang="0">
-                  <a:pos x="connsiteX6" y="connsiteY6"/>
-                </a:cxn>
-                <a:cxn ang="0">
-                  <a:pos x="connsiteX7" y="connsiteY7"/>
-                </a:cxn>
-                <a:cxn ang="0">
-                  <a:pos x="connsiteX8" y="connsiteY8"/>
-                </a:cxn>
-                <a:cxn ang="0">
-                  <a:pos x="connsiteX9" y="connsiteY9"/>
-                </a:cxn>
-                <a:cxn ang="0">
-                  <a:pos x="connsiteX10" y="connsiteY10"/>
-                </a:cxn>
-                <a:cxn ang="0">
-                  <a:pos x="connsiteX11" y="connsiteY11"/>
-                </a:cxn>
-                <a:cxn ang="0">
-                  <a:pos x="connsiteX12" y="connsiteY12"/>
-                </a:cxn>
-                <a:cxn ang="0">
-                  <a:pos x="connsiteX13" y="connsiteY13"/>
-                </a:cxn>
-                <a:cxn ang="0">
-                  <a:pos x="connsiteX14" y="connsiteY14"/>
-                </a:cxn>
-                <a:cxn ang="0">
-                  <a:pos x="connsiteX15" y="connsiteY15"/>
-                </a:cxn>
-                <a:cxn ang="0">
-                  <a:pos x="connsiteX16" y="connsiteY16"/>
-                </a:cxn>
-                <a:cxn ang="0">
-                  <a:pos x="connsiteX17" y="connsiteY17"/>
-                </a:cxn>
-                <a:cxn ang="0">
-                  <a:pos x="connsiteX18" y="connsiteY18"/>
-                </a:cxn>
-                <a:cxn ang="0">
-                  <a:pos x="connsiteX19" y="connsiteY19"/>
-                </a:cxn>
-                <a:cxn ang="0">
-                  <a:pos x="connsiteX20" y="connsiteY20"/>
-                </a:cxn>
-                <a:cxn ang="0">
-                  <a:pos x="connsiteX21" y="connsiteY21"/>
-                </a:cxn>
-                <a:cxn ang="0">
-                  <a:pos x="connsiteX22" y="connsiteY22"/>
-                </a:cxn>
-                <a:cxn ang="0">
-                  <a:pos x="connsiteX23" y="connsiteY23"/>
-                </a:cxn>
-              </a:cxnLst>
-              <a:rect l="l" t="t" r="r" b="b"/>
-              <a:pathLst>
-                <a:path w="3815986" h="2675935">
-                  <a:moveTo>
-                    <a:pt x="3648768" y="0"/>
-                  </a:moveTo>
-                  <a:lnTo>
-                    <a:pt x="3815986" y="0"/>
-                  </a:lnTo>
-                  <a:lnTo>
-                    <a:pt x="3804695" y="200084"/>
-                  </a:lnTo>
-                  <a:cubicBezTo>
-                    <a:pt x="3795228" y="285751"/>
-                    <a:pt x="3781167" y="371032"/>
-                    <a:pt x="3762590" y="455543"/>
-                  </a:cubicBezTo>
-                  <a:cubicBezTo>
-                    <a:pt x="3725537" y="624467"/>
-                    <a:pt x="3668784" y="790112"/>
-                    <a:pt x="3592332" y="947274"/>
-                  </a:cubicBezTo>
-                  <a:cubicBezTo>
-                    <a:pt x="3438712" y="1261596"/>
-                    <a:pt x="3216091" y="1542847"/>
-                    <a:pt x="2953967" y="1782349"/>
-                  </a:cubicBezTo>
-                  <a:cubicBezTo>
-                    <a:pt x="2822599" y="1902099"/>
-                    <a:pt x="2680615" y="2011341"/>
-                    <a:pt x="2530669" y="2109494"/>
-                  </a:cubicBezTo>
-                  <a:cubicBezTo>
-                    <a:pt x="2380520" y="2207551"/>
-                    <a:pt x="2222510" y="2294906"/>
-                    <a:pt x="2057561" y="2369245"/>
-                  </a:cubicBezTo>
-                  <a:cubicBezTo>
-                    <a:pt x="1727252" y="2516859"/>
-                    <a:pt x="1371629" y="2614434"/>
-                    <a:pt x="1007330" y="2655701"/>
-                  </a:cubicBezTo>
-                  <a:cubicBezTo>
-                    <a:pt x="916281" y="2665873"/>
-                    <a:pt x="824568" y="2672188"/>
-                    <a:pt x="732765" y="2674696"/>
-                  </a:cubicBezTo>
-                  <a:cubicBezTo>
-                    <a:pt x="640963" y="2677203"/>
-                    <a:pt x="549072" y="2675901"/>
-                    <a:pt x="457666" y="2670839"/>
-                  </a:cubicBezTo>
-                  <a:cubicBezTo>
-                    <a:pt x="366106" y="2665584"/>
-                    <a:pt x="274572" y="2656521"/>
-                    <a:pt x="183574" y="2643312"/>
-                  </a:cubicBezTo>
-                  <a:lnTo>
-                    <a:pt x="0" y="2607798"/>
-                  </a:lnTo>
-                  <a:lnTo>
-                    <a:pt x="0" y="2356652"/>
-                  </a:lnTo>
-                  <a:lnTo>
-                    <a:pt x="222195" y="2396940"/>
-                  </a:lnTo>
-                  <a:cubicBezTo>
-                    <a:pt x="304990" y="2407980"/>
-                    <a:pt x="388511" y="2415283"/>
-                    <a:pt x="472364" y="2419092"/>
-                  </a:cubicBezTo>
-                  <a:cubicBezTo>
-                    <a:pt x="640376" y="2427095"/>
-                    <a:pt x="808184" y="2421791"/>
-                    <a:pt x="974972" y="2402122"/>
-                  </a:cubicBezTo>
-                  <a:cubicBezTo>
-                    <a:pt x="1141658" y="2382358"/>
-                    <a:pt x="1306812" y="2349286"/>
-                    <a:pt x="1468292" y="2304162"/>
-                  </a:cubicBezTo>
-                  <a:cubicBezTo>
-                    <a:pt x="1629874" y="2259231"/>
-                    <a:pt x="1787475" y="2201091"/>
-                    <a:pt x="1940176" y="2133695"/>
-                  </a:cubicBezTo>
-                  <a:cubicBezTo>
-                    <a:pt x="2246498" y="2000349"/>
-                    <a:pt x="2532507" y="1823520"/>
-                    <a:pt x="2783403" y="1609954"/>
-                  </a:cubicBezTo>
-                  <a:cubicBezTo>
-                    <a:pt x="2908442" y="1502833"/>
-                    <a:pt x="3024295" y="1385975"/>
-                    <a:pt x="3128104" y="1260439"/>
-                  </a:cubicBezTo>
-                  <a:cubicBezTo>
-                    <a:pt x="3232116" y="1135096"/>
-                    <a:pt x="3323881" y="1000689"/>
-                    <a:pt x="3400639" y="859052"/>
-                  </a:cubicBezTo>
-                  <a:cubicBezTo>
-                    <a:pt x="3477399" y="717510"/>
-                    <a:pt x="3541296" y="569316"/>
-                    <a:pt x="3585595" y="415336"/>
-                  </a:cubicBezTo>
-                  <a:cubicBezTo>
-                    <a:pt x="3607796" y="338540"/>
-                    <a:pt x="3624638" y="260224"/>
-                    <a:pt x="3635918" y="181137"/>
-                  </a:cubicBezTo>
-                  <a:close/>
-                </a:path>
-              </a:pathLst>
-            </a:custGeom>
-            <a:gradFill>
-              <a:gsLst>
-                <a:gs pos="2000">
-                  <a:schemeClr val="bg1">
-                    <a:alpha val="10000"/>
-                  </a:schemeClr>
-                </a:gs>
-                <a:gs pos="16000">
-                  <a:schemeClr val="accent6">
-                    <a:alpha val="10000"/>
-                  </a:schemeClr>
-                </a:gs>
-                <a:gs pos="100000">
-                  <a:schemeClr val="bg1">
-                    <a:alpha val="10000"/>
-                  </a:schemeClr>
-                </a:gs>
-                <a:gs pos="85000">
-                  <a:schemeClr val="accent1">
-                    <a:alpha val="10000"/>
-                  </a:schemeClr>
-                </a:gs>
-              </a:gsLst>
-              <a:lin ang="12000000" scaled="0"/>
-            </a:gradFill>
-            <a:ln>
-              <a:noFill/>
-            </a:ln>
-          </p:spPr>
-          <p:style>
-            <a:lnRef idx="2">
-              <a:schemeClr val="accent1">
-                <a:shade val="50000"/>
-              </a:schemeClr>
-            </a:lnRef>
-            <a:fillRef idx="1">
-              <a:schemeClr val="accent1"/>
-            </a:fillRef>
-            <a:effectRef idx="0">
-              <a:schemeClr val="accent1"/>
-            </a:effectRef>
-            <a:fontRef idx="minor">
-              <a:schemeClr val="lt1"/>
-            </a:fontRef>
-          </p:style>
-          <p:txBody>
-            <a:bodyPr rtlCol="0" anchor="ctr"/>
-            <a:lstStyle/>
-            <a:p>
-              <a:pPr algn="ctr"/>
-              <a:endParaRPr lang="en-US"/>
-            </a:p>
-          </p:txBody>
-        </p:sp>
-        <p:sp>
-          <p:nvSpPr>
-            <p:cNvPr id="36" name="Freeform: Shape 35">
-              <a:extLst>
-                <a:ext uri="{FF2B5EF4-FFF2-40B4-BE49-F238E27FC236}">
-                  <a16:creationId xmlns:a16="http://schemas.microsoft.com/office/drawing/2014/main" id="{EC4BC137-BB50-4235-A83F-4B4EEE15904C}"/>
-                </a:ext>
-                <a:ext uri="{C183D7F6-B498-43B3-948B-1728B52AA6E4}">
-                  <adec:decorative xmlns:adec="http://schemas.microsoft.com/office/drawing/2017/decorative" val="1"/>
-                </a:ext>
-              </a:extLst>
-            </p:cNvPr>
-            <p:cNvSpPr/>
-            <p:nvPr>
-              <p:extLst>
-                <p:ext uri="{386F3935-93C4-4BCD-93E2-E3B085C9AB24}">
-                  <p16:designElem xmlns:p16="http://schemas.microsoft.com/office/powerpoint/2015/main" val="1"/>
-                </p:ext>
-              </p:extLst>
-            </p:nvPr>
-          </p:nvSpPr>
-          <p:spPr>
-            <a:xfrm>
-              <a:off x="305" y="-1"/>
-              <a:ext cx="3832270" cy="2876136"/>
-            </a:xfrm>
-            <a:custGeom>
-              <a:avLst/>
-              <a:gdLst>
-                <a:gd name="connsiteX0" fmla="*/ 3800718 w 3832270"/>
-                <a:gd name="connsiteY0" fmla="*/ 0 h 2876136"/>
-                <a:gd name="connsiteX1" fmla="*/ 3832270 w 3832270"/>
-                <a:gd name="connsiteY1" fmla="*/ 0 h 2876136"/>
-                <a:gd name="connsiteX2" fmla="*/ 3824562 w 3832270"/>
-                <a:gd name="connsiteY2" fmla="*/ 143769 h 2876136"/>
-                <a:gd name="connsiteX3" fmla="*/ 3628155 w 3832270"/>
-                <a:gd name="connsiteY3" fmla="*/ 922055 h 2876136"/>
-                <a:gd name="connsiteX4" fmla="*/ 3514853 w 3832270"/>
-                <a:gd name="connsiteY4" fmla="*/ 1169078 h 2876136"/>
-                <a:gd name="connsiteX5" fmla="*/ 3379198 w 3832270"/>
-                <a:gd name="connsiteY5" fmla="*/ 1407037 h 2876136"/>
-                <a:gd name="connsiteX6" fmla="*/ 3043787 w 3832270"/>
-                <a:gd name="connsiteY6" fmla="*/ 1848342 h 2876136"/>
-                <a:gd name="connsiteX7" fmla="*/ 2845661 w 3832270"/>
-                <a:gd name="connsiteY7" fmla="*/ 2047444 h 2876136"/>
-                <a:gd name="connsiteX8" fmla="*/ 2793197 w 3832270"/>
-                <a:gd name="connsiteY8" fmla="*/ 2094689 h 2876136"/>
-                <a:gd name="connsiteX9" fmla="*/ 2739710 w 3832270"/>
-                <a:gd name="connsiteY9" fmla="*/ 2140969 h 2876136"/>
-                <a:gd name="connsiteX10" fmla="*/ 2629166 w 3832270"/>
-                <a:gd name="connsiteY10" fmla="*/ 2229867 h 2876136"/>
-                <a:gd name="connsiteX11" fmla="*/ 2145952 w 3832270"/>
-                <a:gd name="connsiteY11" fmla="*/ 2535994 h 2876136"/>
-                <a:gd name="connsiteX12" fmla="*/ 1034987 w 3832270"/>
-                <a:gd name="connsiteY12" fmla="*/ 2863910 h 2876136"/>
-                <a:gd name="connsiteX13" fmla="*/ 741909 w 3832270"/>
-                <a:gd name="connsiteY13" fmla="*/ 2875939 h 2876136"/>
-                <a:gd name="connsiteX14" fmla="*/ 450208 w 3832270"/>
-                <a:gd name="connsiteY14" fmla="*/ 2857451 h 2876136"/>
-                <a:gd name="connsiteX15" fmla="*/ 22215 w 3832270"/>
-                <a:gd name="connsiteY15" fmla="*/ 2775923 h 2876136"/>
-                <a:gd name="connsiteX16" fmla="*/ 0 w 3832270"/>
-                <a:gd name="connsiteY16" fmla="*/ 2769256 h 2876136"/>
-                <a:gd name="connsiteX17" fmla="*/ 0 w 3832270"/>
-                <a:gd name="connsiteY17" fmla="*/ 2590612 h 2876136"/>
-                <a:gd name="connsiteX18" fmla="*/ 199046 w 3832270"/>
-                <a:gd name="connsiteY18" fmla="*/ 2627410 h 2876136"/>
-                <a:gd name="connsiteX19" fmla="*/ 468174 w 3832270"/>
-                <a:gd name="connsiteY19" fmla="*/ 2649670 h 2876136"/>
-                <a:gd name="connsiteX20" fmla="*/ 1003650 w 3832270"/>
-                <a:gd name="connsiteY20" fmla="*/ 2622480 h 2876136"/>
-                <a:gd name="connsiteX21" fmla="*/ 1266489 w 3832270"/>
-                <a:gd name="connsiteY21" fmla="*/ 2573982 h 2876136"/>
-                <a:gd name="connsiteX22" fmla="*/ 1524223 w 3832270"/>
-                <a:gd name="connsiteY22" fmla="*/ 2504657 h 2876136"/>
-                <a:gd name="connsiteX23" fmla="*/ 1775731 w 3832270"/>
-                <a:gd name="connsiteY23" fmla="*/ 2416243 h 2876136"/>
-                <a:gd name="connsiteX24" fmla="*/ 2019789 w 3832270"/>
-                <a:gd name="connsiteY24" fmla="*/ 2309412 h 2876136"/>
-                <a:gd name="connsiteX25" fmla="*/ 2482486 w 3832270"/>
-                <a:gd name="connsiteY25" fmla="*/ 2046962 h 2876136"/>
-                <a:gd name="connsiteX26" fmla="*/ 2591908 w 3832270"/>
-                <a:gd name="connsiteY26" fmla="*/ 1971371 h 2876136"/>
-                <a:gd name="connsiteX27" fmla="*/ 2645702 w 3832270"/>
-                <a:gd name="connsiteY27" fmla="*/ 1932321 h 2876136"/>
-                <a:gd name="connsiteX28" fmla="*/ 2698779 w 3832270"/>
-                <a:gd name="connsiteY28" fmla="*/ 1892309 h 2876136"/>
-                <a:gd name="connsiteX29" fmla="*/ 2903537 w 3832270"/>
-                <a:gd name="connsiteY29" fmla="*/ 1722516 h 2876136"/>
-                <a:gd name="connsiteX30" fmla="*/ 3269061 w 3832270"/>
-                <a:gd name="connsiteY30" fmla="*/ 1337327 h 2876136"/>
-                <a:gd name="connsiteX31" fmla="*/ 3424928 w 3832270"/>
-                <a:gd name="connsiteY31" fmla="*/ 1122508 h 2876136"/>
-                <a:gd name="connsiteX32" fmla="*/ 3557622 w 3832270"/>
-                <a:gd name="connsiteY32" fmla="*/ 893226 h 2876136"/>
-                <a:gd name="connsiteX33" fmla="*/ 3587019 w 3832270"/>
-                <a:gd name="connsiteY33" fmla="*/ 833929 h 2876136"/>
-                <a:gd name="connsiteX34" fmla="*/ 3601310 w 3832270"/>
-                <a:gd name="connsiteY34" fmla="*/ 804040 h 2876136"/>
-                <a:gd name="connsiteX35" fmla="*/ 3614885 w 3832270"/>
-                <a:gd name="connsiteY35" fmla="*/ 773861 h 2876136"/>
-                <a:gd name="connsiteX36" fmla="*/ 3640812 w 3832270"/>
-                <a:gd name="connsiteY36" fmla="*/ 713022 h 2876136"/>
-                <a:gd name="connsiteX37" fmla="*/ 3665105 w 3832270"/>
-                <a:gd name="connsiteY37" fmla="*/ 651506 h 2876136"/>
-                <a:gd name="connsiteX38" fmla="*/ 3744110 w 3832270"/>
-                <a:gd name="connsiteY38" fmla="*/ 399567 h 2876136"/>
-                <a:gd name="connsiteX39" fmla="*/ 3792123 w 3832270"/>
-                <a:gd name="connsiteY39" fmla="*/ 140444 h 2876136"/>
-              </a:gdLst>
-              <a:ahLst/>
-              <a:cxnLst>
-                <a:cxn ang="0">
-                  <a:pos x="connsiteX0" y="connsiteY0"/>
-                </a:cxn>
-                <a:cxn ang="0">
-                  <a:pos x="connsiteX1" y="connsiteY1"/>
-                </a:cxn>
-                <a:cxn ang="0">
-                  <a:pos x="connsiteX2" y="connsiteY2"/>
-                </a:cxn>
-                <a:cxn ang="0">
-                  <a:pos x="connsiteX3" y="connsiteY3"/>
-                </a:cxn>
-                <a:cxn ang="0">
-                  <a:pos x="connsiteX4" y="connsiteY4"/>
-                </a:cxn>
-                <a:cxn ang="0">
-                  <a:pos x="connsiteX5" y="connsiteY5"/>
-                </a:cxn>
-                <a:cxn ang="0">
-                  <a:pos x="connsiteX6" y="connsiteY6"/>
-                </a:cxn>
-                <a:cxn ang="0">
-                  <a:pos x="connsiteX7" y="connsiteY7"/>
-                </a:cxn>
-                <a:cxn ang="0">
-                  <a:pos x="connsiteX8" y="connsiteY8"/>
-                </a:cxn>
-                <a:cxn ang="0">
-                  <a:pos x="connsiteX9" y="connsiteY9"/>
-                </a:cxn>
-                <a:cxn ang="0">
-                  <a:pos x="connsiteX10" y="connsiteY10"/>
-                </a:cxn>
-                <a:cxn ang="0">
-                  <a:pos x="connsiteX11" y="connsiteY11"/>
-                </a:cxn>
-                <a:cxn ang="0">
-                  <a:pos x="connsiteX12" y="connsiteY12"/>
-                </a:cxn>
-                <a:cxn ang="0">
-                  <a:pos x="connsiteX13" y="connsiteY13"/>
-                </a:cxn>
-                <a:cxn ang="0">
-                  <a:pos x="connsiteX14" y="connsiteY14"/>
-                </a:cxn>
-                <a:cxn ang="0">
-                  <a:pos x="connsiteX15" y="connsiteY15"/>
-                </a:cxn>
-                <a:cxn ang="0">
-                  <a:pos x="connsiteX16" y="connsiteY16"/>
-                </a:cxn>
-                <a:cxn ang="0">
-                  <a:pos x="connsiteX17" y="connsiteY17"/>
-                </a:cxn>
-                <a:cxn ang="0">
-                  <a:pos x="connsiteX18" y="connsiteY18"/>
-                </a:cxn>
-                <a:cxn ang="0">
-                  <a:pos x="connsiteX19" y="connsiteY19"/>
-                </a:cxn>
-                <a:cxn ang="0">
-                  <a:pos x="connsiteX20" y="connsiteY20"/>
-                </a:cxn>
-                <a:cxn ang="0">
-                  <a:pos x="connsiteX21" y="connsiteY21"/>
-                </a:cxn>
-                <a:cxn ang="0">
-                  <a:pos x="connsiteX22" y="connsiteY22"/>
-                </a:cxn>
-                <a:cxn ang="0">
-                  <a:pos x="connsiteX23" y="connsiteY23"/>
-                </a:cxn>
-                <a:cxn ang="0">
-                  <a:pos x="connsiteX24" y="connsiteY24"/>
-                </a:cxn>
-                <a:cxn ang="0">
-                  <a:pos x="connsiteX25" y="connsiteY25"/>
-                </a:cxn>
-                <a:cxn ang="0">
-                  <a:pos x="connsiteX26" y="connsiteY26"/>
-                </a:cxn>
-                <a:cxn ang="0">
-                  <a:pos x="connsiteX27" y="connsiteY27"/>
-                </a:cxn>
-                <a:cxn ang="0">
-                  <a:pos x="connsiteX28" y="connsiteY28"/>
-                </a:cxn>
-                <a:cxn ang="0">
-                  <a:pos x="connsiteX29" y="connsiteY29"/>
-                </a:cxn>
-                <a:cxn ang="0">
-                  <a:pos x="connsiteX30" y="connsiteY30"/>
-                </a:cxn>
-                <a:cxn ang="0">
-                  <a:pos x="connsiteX31" y="connsiteY31"/>
-                </a:cxn>
-                <a:cxn ang="0">
-                  <a:pos x="connsiteX32" y="connsiteY32"/>
-                </a:cxn>
-                <a:cxn ang="0">
-                  <a:pos x="connsiteX33" y="connsiteY33"/>
-                </a:cxn>
-                <a:cxn ang="0">
-                  <a:pos x="connsiteX34" y="connsiteY34"/>
-                </a:cxn>
-                <a:cxn ang="0">
-                  <a:pos x="connsiteX35" y="connsiteY35"/>
-                </a:cxn>
-                <a:cxn ang="0">
-                  <a:pos x="connsiteX36" y="connsiteY36"/>
-                </a:cxn>
-                <a:cxn ang="0">
-                  <a:pos x="connsiteX37" y="connsiteY37"/>
-                </a:cxn>
-                <a:cxn ang="0">
-                  <a:pos x="connsiteX38" y="connsiteY38"/>
-                </a:cxn>
-                <a:cxn ang="0">
-                  <a:pos x="connsiteX39" y="connsiteY39"/>
-                </a:cxn>
-              </a:cxnLst>
-              <a:rect l="l" t="t" r="r" b="b"/>
-              <a:pathLst>
-                <a:path w="3832270" h="2876136">
-                  <a:moveTo>
-                    <a:pt x="3800718" y="0"/>
-                  </a:moveTo>
-                  <a:lnTo>
-                    <a:pt x="3832270" y="0"/>
-                  </a:lnTo>
-                  <a:lnTo>
-                    <a:pt x="3824562" y="143769"/>
-                  </a:lnTo>
-                  <a:cubicBezTo>
-                    <a:pt x="3797131" y="409191"/>
-                    <a:pt x="3730585" y="671345"/>
-                    <a:pt x="3628155" y="922055"/>
-                  </a:cubicBezTo>
-                  <a:cubicBezTo>
-                    <a:pt x="3593858" y="1005553"/>
-                    <a:pt x="3556704" y="1088280"/>
-                    <a:pt x="3514853" y="1169078"/>
-                  </a:cubicBezTo>
-                  <a:cubicBezTo>
-                    <a:pt x="3473616" y="1250166"/>
-                    <a:pt x="3428194" y="1329517"/>
-                    <a:pt x="3379198" y="1407037"/>
-                  </a:cubicBezTo>
-                  <a:cubicBezTo>
-                    <a:pt x="3281106" y="1561980"/>
-                    <a:pt x="3169132" y="1710174"/>
-                    <a:pt x="3043787" y="1848342"/>
-                  </a:cubicBezTo>
-                  <a:cubicBezTo>
-                    <a:pt x="2980806" y="1917184"/>
-                    <a:pt x="2915071" y="1984001"/>
-                    <a:pt x="2845661" y="2047444"/>
-                  </a:cubicBezTo>
-                  <a:cubicBezTo>
-                    <a:pt x="2828411" y="2063450"/>
-                    <a:pt x="2811060" y="2079263"/>
-                    <a:pt x="2793197" y="2094689"/>
-                  </a:cubicBezTo>
-                  <a:cubicBezTo>
-                    <a:pt x="2775436" y="2110213"/>
-                    <a:pt x="2757982" y="2126025"/>
-                    <a:pt x="2739710" y="2140969"/>
-                  </a:cubicBezTo>
-                  <a:cubicBezTo>
-                    <a:pt x="2703576" y="2171341"/>
-                    <a:pt x="2666524" y="2200749"/>
-                    <a:pt x="2629166" y="2229867"/>
-                  </a:cubicBezTo>
-                  <a:cubicBezTo>
-                    <a:pt x="2479015" y="2345569"/>
-                    <a:pt x="2316821" y="2448061"/>
-                    <a:pt x="2145952" y="2535994"/>
-                  </a:cubicBezTo>
-                  <a:cubicBezTo>
-                    <a:pt x="1804312" y="2711957"/>
-                    <a:pt x="1424600" y="2826982"/>
-                    <a:pt x="1034987" y="2863910"/>
-                  </a:cubicBezTo>
-                  <a:cubicBezTo>
-                    <a:pt x="937762" y="2873167"/>
-                    <a:pt x="839720" y="2877096"/>
-                    <a:pt x="741909" y="2875939"/>
-                  </a:cubicBezTo>
-                  <a:cubicBezTo>
-                    <a:pt x="644097" y="2874782"/>
-                    <a:pt x="546515" y="2868539"/>
-                    <a:pt x="450208" y="2857451"/>
-                  </a:cubicBezTo>
-                  <a:cubicBezTo>
-                    <a:pt x="305520" y="2840674"/>
-                    <a:pt x="162095" y="2813810"/>
-                    <a:pt x="22215" y="2775923"/>
-                  </a:cubicBezTo>
-                  <a:lnTo>
-                    <a:pt x="0" y="2769256"/>
-                  </a:lnTo>
-                  <a:lnTo>
-                    <a:pt x="0" y="2590612"/>
-                  </a:lnTo>
-                  <a:lnTo>
-                    <a:pt x="199046" y="2627410"/>
-                  </a:lnTo>
-                  <a:cubicBezTo>
-                    <a:pt x="288321" y="2639209"/>
-                    <a:pt x="378197" y="2646537"/>
-                    <a:pt x="468174" y="2649670"/>
-                  </a:cubicBezTo>
-                  <a:cubicBezTo>
-                    <a:pt x="648333" y="2656805"/>
-                    <a:pt x="826655" y="2647163"/>
-                    <a:pt x="1003650" y="2622480"/>
-                  </a:cubicBezTo>
-                  <a:cubicBezTo>
-                    <a:pt x="1091943" y="2609658"/>
-                    <a:pt x="1179725" y="2593747"/>
-                    <a:pt x="1266489" y="2573982"/>
-                  </a:cubicBezTo>
-                  <a:cubicBezTo>
-                    <a:pt x="1353250" y="2553927"/>
-                    <a:pt x="1439298" y="2531076"/>
-                    <a:pt x="1524223" y="2504657"/>
-                  </a:cubicBezTo>
-                  <a:cubicBezTo>
-                    <a:pt x="1609149" y="2478336"/>
-                    <a:pt x="1693052" y="2448833"/>
-                    <a:pt x="1775731" y="2416243"/>
-                  </a:cubicBezTo>
-                  <a:cubicBezTo>
-                    <a:pt x="1858309" y="2383557"/>
-                    <a:pt x="1939764" y="2347882"/>
-                    <a:pt x="2019789" y="2309412"/>
-                  </a:cubicBezTo>
-                  <a:cubicBezTo>
-                    <a:pt x="2179839" y="2232567"/>
-                    <a:pt x="2334583" y="2144923"/>
-                    <a:pt x="2482486" y="2046962"/>
-                  </a:cubicBezTo>
-                  <a:cubicBezTo>
-                    <a:pt x="2519334" y="2022376"/>
-                    <a:pt x="2556081" y="1997403"/>
-                    <a:pt x="2591908" y="1971371"/>
-                  </a:cubicBezTo>
-                  <a:cubicBezTo>
-                    <a:pt x="2610077" y="1958644"/>
-                    <a:pt x="2627838" y="1945434"/>
-                    <a:pt x="2645702" y="1932321"/>
-                  </a:cubicBezTo>
-                  <a:cubicBezTo>
-                    <a:pt x="2663666" y="1919305"/>
-                    <a:pt x="2681325" y="1905903"/>
-                    <a:pt x="2698779" y="1892309"/>
-                  </a:cubicBezTo>
-                  <a:cubicBezTo>
-                    <a:pt x="2768903" y="1838025"/>
-                    <a:pt x="2837496" y="1781717"/>
-                    <a:pt x="2903537" y="1722516"/>
-                  </a:cubicBezTo>
-                  <a:cubicBezTo>
-                    <a:pt x="3035926" y="1604501"/>
-                    <a:pt x="3158720" y="1475784"/>
-                    <a:pt x="3269061" y="1337327"/>
-                  </a:cubicBezTo>
-                  <a:cubicBezTo>
-                    <a:pt x="3324182" y="1268099"/>
-                    <a:pt x="3376341" y="1196461"/>
-                    <a:pt x="3424928" y="1122508"/>
-                  </a:cubicBezTo>
-                  <a:cubicBezTo>
-                    <a:pt x="3472697" y="1048170"/>
-                    <a:pt x="3517814" y="972000"/>
-                    <a:pt x="3557622" y="893226"/>
-                  </a:cubicBezTo>
-                  <a:cubicBezTo>
-                    <a:pt x="3567931" y="873654"/>
-                    <a:pt x="3577526" y="853791"/>
-                    <a:pt x="3587019" y="833929"/>
-                  </a:cubicBezTo>
-                  <a:lnTo>
-                    <a:pt x="3601310" y="804040"/>
-                  </a:lnTo>
-                  <a:lnTo>
-                    <a:pt x="3614885" y="773861"/>
-                  </a:lnTo>
-                  <a:cubicBezTo>
-                    <a:pt x="3623766" y="753709"/>
-                    <a:pt x="3632748" y="733559"/>
-                    <a:pt x="3640812" y="713022"/>
-                  </a:cubicBezTo>
-                  <a:cubicBezTo>
-                    <a:pt x="3648876" y="692485"/>
-                    <a:pt x="3657756" y="672236"/>
-                    <a:pt x="3665105" y="651506"/>
-                  </a:cubicBezTo>
-                  <a:cubicBezTo>
-                    <a:pt x="3696544" y="569166"/>
-                    <a:pt x="3723185" y="485089"/>
-                    <a:pt x="3744110" y="399567"/>
-                  </a:cubicBezTo>
-                  <a:cubicBezTo>
-                    <a:pt x="3765341" y="314238"/>
-                    <a:pt x="3781392" y="227654"/>
-                    <a:pt x="3792123" y="140444"/>
-                  </a:cubicBezTo>
-                  <a:close/>
-                </a:path>
-              </a:pathLst>
-            </a:custGeom>
-            <a:gradFill>
-              <a:gsLst>
-                <a:gs pos="2000">
-                  <a:schemeClr val="bg1">
-                    <a:alpha val="10000"/>
-                  </a:schemeClr>
-                </a:gs>
-                <a:gs pos="16000">
-                  <a:schemeClr val="accent6">
-                    <a:alpha val="10000"/>
-                  </a:schemeClr>
-                </a:gs>
-                <a:gs pos="100000">
-                  <a:schemeClr val="bg1">
-                    <a:alpha val="10000"/>
-                  </a:schemeClr>
-                </a:gs>
-                <a:gs pos="85000">
-                  <a:schemeClr val="accent1">
-                    <a:alpha val="10000"/>
-                  </a:schemeClr>
-                </a:gs>
-              </a:gsLst>
-              <a:lin ang="12000000" scaled="0"/>
-            </a:gradFill>
-            <a:ln>
-              <a:noFill/>
-            </a:ln>
-          </p:spPr>
-          <p:style>
-            <a:lnRef idx="2">
-              <a:schemeClr val="accent1">
-                <a:shade val="50000"/>
-              </a:schemeClr>
-            </a:lnRef>
-            <a:fillRef idx="1">
-              <a:schemeClr val="accent1"/>
-            </a:fillRef>
-            <a:effectRef idx="0">
-              <a:schemeClr val="accent1"/>
-            </a:effectRef>
-            <a:fontRef idx="minor">
-              <a:schemeClr val="lt1"/>
-            </a:fontRef>
-          </p:style>
-          <p:txBody>
-            <a:bodyPr rtlCol="0" anchor="ctr"/>
-            <a:lstStyle/>
-            <a:p>
-              <a:pPr algn="ctr"/>
-              <a:endParaRPr lang="en-US"/>
-            </a:p>
-          </p:txBody>
-        </p:sp>
-      </p:grpSp>
-      <p:grpSp>
-        <p:nvGrpSpPr>
-          <p:cNvPr id="38" name="Group 37">
-            <a:extLst>
-              <a:ext uri="{FF2B5EF4-FFF2-40B4-BE49-F238E27FC236}">
-                <a16:creationId xmlns:a16="http://schemas.microsoft.com/office/drawing/2014/main" id="{9DB3963A-4187-4A72-9DA4-CA6BADE22931}"/>
-              </a:ext>
-              <a:ext uri="{C183D7F6-B498-43B3-948B-1728B52AA6E4}">
-                <adec:decorative xmlns:adec="http://schemas.microsoft.com/office/drawing/2017/decorative" val="1"/>
-              </a:ext>
-            </a:extLst>
-          </p:cNvPr>
-          <p:cNvGrpSpPr>
-            <a:grpSpLocks noGrp="1" noUngrp="1" noRot="1" noChangeAspect="1" noMove="1" noResize="1"/>
-          </p:cNvGrpSpPr>
-          <p:nvPr>
-            <p:extLst>
-              <p:ext uri="{386F3935-93C4-4BCD-93E2-E3B085C9AB24}">
-                <p16:designElem xmlns:p16="http://schemas.microsoft.com/office/powerpoint/2015/main" val="1"/>
-              </p:ext>
-            </p:extLst>
-          </p:nvPr>
-        </p:nvGrpSpPr>
-        <p:grpSpPr>
-          <a:xfrm rot="5400000">
-            <a:off x="9072780" y="3734338"/>
-            <a:ext cx="3878664" cy="2368659"/>
-            <a:chOff x="6867015" y="-1"/>
-            <a:chExt cx="5324985" cy="3251912"/>
-          </a:xfrm>
-          <a:solidFill>
-            <a:schemeClr val="accent5">
-              <a:alpha val="10000"/>
-            </a:schemeClr>
-          </a:solidFill>
-        </p:grpSpPr>
-        <p:sp>
-          <p:nvSpPr>
-            <p:cNvPr id="39" name="Freeform: Shape 38">
-              <a:extLst>
-                <a:ext uri="{FF2B5EF4-FFF2-40B4-BE49-F238E27FC236}">
-                  <a16:creationId xmlns:a16="http://schemas.microsoft.com/office/drawing/2014/main" id="{2428E75E-001A-4568-B035-574F1303EF58}"/>
-                </a:ext>
-                <a:ext uri="{C183D7F6-B498-43B3-948B-1728B52AA6E4}">
-                  <adec:decorative xmlns:adec="http://schemas.microsoft.com/office/drawing/2017/decorative" val="1"/>
-                </a:ext>
-              </a:extLst>
-            </p:cNvPr>
-            <p:cNvSpPr/>
-            <p:nvPr>
-              <p:extLst>
-                <p:ext uri="{386F3935-93C4-4BCD-93E2-E3B085C9AB24}">
-                  <p16:designElem xmlns:p16="http://schemas.microsoft.com/office/powerpoint/2015/main" val="1"/>
-                </p:ext>
-              </p:extLst>
-            </p:nvPr>
-          </p:nvSpPr>
-          <p:spPr>
-            <a:xfrm>
-              <a:off x="6867015" y="-1"/>
-              <a:ext cx="5324985" cy="3251912"/>
-            </a:xfrm>
-            <a:custGeom>
-              <a:avLst/>
-              <a:gdLst>
-                <a:gd name="connsiteX0" fmla="*/ 0 w 5324985"/>
-                <a:gd name="connsiteY0" fmla="*/ 0 h 3251912"/>
-                <a:gd name="connsiteX1" fmla="*/ 36826 w 5324985"/>
-                <a:gd name="connsiteY1" fmla="*/ 0 h 3251912"/>
-                <a:gd name="connsiteX2" fmla="*/ 45003 w 5324985"/>
-                <a:gd name="connsiteY2" fmla="*/ 152909 h 3251912"/>
-                <a:gd name="connsiteX3" fmla="*/ 68956 w 5324985"/>
-                <a:gd name="connsiteY3" fmla="*/ 308600 h 3251912"/>
-                <a:gd name="connsiteX4" fmla="*/ 167774 w 5324985"/>
-                <a:gd name="connsiteY4" fmla="*/ 607968 h 3251912"/>
-                <a:gd name="connsiteX5" fmla="*/ 201857 w 5324985"/>
-                <a:gd name="connsiteY5" fmla="*/ 679539 h 3251912"/>
-                <a:gd name="connsiteX6" fmla="*/ 239741 w 5324985"/>
-                <a:gd name="connsiteY6" fmla="*/ 749488 h 3251912"/>
-                <a:gd name="connsiteX7" fmla="*/ 323724 w 5324985"/>
-                <a:gd name="connsiteY7" fmla="*/ 885101 h 3251912"/>
-                <a:gd name="connsiteX8" fmla="*/ 416412 w 5324985"/>
-                <a:gd name="connsiteY8" fmla="*/ 1016081 h 3251912"/>
-                <a:gd name="connsiteX9" fmla="*/ 515719 w 5324985"/>
-                <a:gd name="connsiteY9" fmla="*/ 1143356 h 3251912"/>
-                <a:gd name="connsiteX10" fmla="*/ 722427 w 5324985"/>
-                <a:gd name="connsiteY10" fmla="*/ 1395127 h 3251912"/>
-                <a:gd name="connsiteX11" fmla="*/ 825780 w 5324985"/>
-                <a:gd name="connsiteY11" fmla="*/ 1522749 h 3251912"/>
-                <a:gd name="connsiteX12" fmla="*/ 926314 w 5324985"/>
-                <a:gd name="connsiteY12" fmla="*/ 1651992 h 3251912"/>
-                <a:gd name="connsiteX13" fmla="*/ 1026848 w 5324985"/>
-                <a:gd name="connsiteY13" fmla="*/ 1776836 h 3251912"/>
-                <a:gd name="connsiteX14" fmla="*/ 1131918 w 5324985"/>
-                <a:gd name="connsiteY14" fmla="*/ 1897393 h 3251912"/>
-                <a:gd name="connsiteX15" fmla="*/ 1354688 w 5324985"/>
-                <a:gd name="connsiteY15" fmla="*/ 2124728 h 3251912"/>
-                <a:gd name="connsiteX16" fmla="*/ 1855027 w 5324985"/>
-                <a:gd name="connsiteY16" fmla="*/ 2504236 h 3251912"/>
-                <a:gd name="connsiteX17" fmla="*/ 2131618 w 5324985"/>
-                <a:gd name="connsiteY17" fmla="*/ 2646913 h 3251912"/>
-                <a:gd name="connsiteX18" fmla="*/ 2423534 w 5324985"/>
-                <a:gd name="connsiteY18" fmla="*/ 2754732 h 3251912"/>
-                <a:gd name="connsiteX19" fmla="*/ 2727588 w 5324985"/>
-                <a:gd name="connsiteY19" fmla="*/ 2829197 h 3251912"/>
-                <a:gd name="connsiteX20" fmla="*/ 3041083 w 5324985"/>
-                <a:gd name="connsiteY20" fmla="*/ 2870890 h 3251912"/>
-                <a:gd name="connsiteX21" fmla="*/ 3360340 w 5324985"/>
-                <a:gd name="connsiteY21" fmla="*/ 2883976 h 3251912"/>
-                <a:gd name="connsiteX22" fmla="*/ 3439663 w 5324985"/>
-                <a:gd name="connsiteY22" fmla="*/ 2883396 h 3251912"/>
-                <a:gd name="connsiteX23" fmla="*/ 3478529 w 5324985"/>
-                <a:gd name="connsiteY23" fmla="*/ 2882471 h 3251912"/>
-                <a:gd name="connsiteX24" fmla="*/ 3517271 w 5324985"/>
-                <a:gd name="connsiteY24" fmla="*/ 2880616 h 3251912"/>
-                <a:gd name="connsiteX25" fmla="*/ 3671260 w 5324985"/>
-                <a:gd name="connsiteY25" fmla="*/ 2867878 h 3251912"/>
-                <a:gd name="connsiteX26" fmla="*/ 4265268 w 5324985"/>
-                <a:gd name="connsiteY26" fmla="*/ 2716283 h 3251912"/>
-                <a:gd name="connsiteX27" fmla="*/ 4546395 w 5324985"/>
-                <a:gd name="connsiteY27" fmla="*/ 2584724 h 3251912"/>
-                <a:gd name="connsiteX28" fmla="*/ 4817837 w 5324985"/>
-                <a:gd name="connsiteY28" fmla="*/ 2424674 h 3251912"/>
-                <a:gd name="connsiteX29" fmla="*/ 5081677 w 5324985"/>
-                <a:gd name="connsiteY29" fmla="*/ 2243548 h 3251912"/>
-                <a:gd name="connsiteX30" fmla="*/ 5211881 w 5324985"/>
-                <a:gd name="connsiteY30" fmla="*/ 2147658 h 3251912"/>
-                <a:gd name="connsiteX31" fmla="*/ 5324985 w 5324985"/>
-                <a:gd name="connsiteY31" fmla="*/ 2062128 h 3251912"/>
-                <a:gd name="connsiteX32" fmla="*/ 5324985 w 5324985"/>
-                <a:gd name="connsiteY32" fmla="*/ 2514993 h 3251912"/>
-                <a:gd name="connsiteX33" fmla="*/ 5314867 w 5324985"/>
-                <a:gd name="connsiteY33" fmla="*/ 2522881 h 3251912"/>
-                <a:gd name="connsiteX34" fmla="*/ 5038276 w 5324985"/>
-                <a:gd name="connsiteY34" fmla="*/ 2722421 h 3251912"/>
-                <a:gd name="connsiteX35" fmla="*/ 4741701 w 5324985"/>
-                <a:gd name="connsiteY35" fmla="*/ 2904937 h 3251912"/>
-                <a:gd name="connsiteX36" fmla="*/ 4420728 w 5324985"/>
-                <a:gd name="connsiteY36" fmla="*/ 3058848 h 3251912"/>
-                <a:gd name="connsiteX37" fmla="*/ 3717481 w 5324985"/>
-                <a:gd name="connsiteY37" fmla="*/ 3237079 h 3251912"/>
-                <a:gd name="connsiteX38" fmla="*/ 3535661 w 5324985"/>
-                <a:gd name="connsiteY38" fmla="*/ 3249934 h 3251912"/>
-                <a:gd name="connsiteX39" fmla="*/ 3490175 w 5324985"/>
-                <a:gd name="connsiteY39" fmla="*/ 3251555 h 3251912"/>
-                <a:gd name="connsiteX40" fmla="*/ 3444813 w 5324985"/>
-                <a:gd name="connsiteY40" fmla="*/ 3251787 h 3251912"/>
-                <a:gd name="connsiteX41" fmla="*/ 3355681 w 5324985"/>
-                <a:gd name="connsiteY41" fmla="*/ 3250745 h 3251912"/>
-                <a:gd name="connsiteX42" fmla="*/ 3179011 w 5324985"/>
-                <a:gd name="connsiteY42" fmla="*/ 3243795 h 3251912"/>
-                <a:gd name="connsiteX43" fmla="*/ 3002217 w 5324985"/>
-                <a:gd name="connsiteY43" fmla="*/ 3227814 h 3251912"/>
-                <a:gd name="connsiteX44" fmla="*/ 2650103 w 5324985"/>
-                <a:gd name="connsiteY44" fmla="*/ 3170836 h 3251912"/>
-                <a:gd name="connsiteX45" fmla="*/ 2305836 w 5324985"/>
-                <a:gd name="connsiteY45" fmla="*/ 3072514 h 3251912"/>
-                <a:gd name="connsiteX46" fmla="*/ 1978611 w 5324985"/>
-                <a:gd name="connsiteY46" fmla="*/ 2929952 h 3251912"/>
-                <a:gd name="connsiteX47" fmla="*/ 1678235 w 5324985"/>
-                <a:gd name="connsiteY47" fmla="*/ 2744424 h 3251912"/>
-                <a:gd name="connsiteX48" fmla="*/ 1175688 w 5324985"/>
-                <a:gd name="connsiteY48" fmla="*/ 2277018 h 3251912"/>
-                <a:gd name="connsiteX49" fmla="*/ 971310 w 5324985"/>
-                <a:gd name="connsiteY49" fmla="*/ 2012044 h 3251912"/>
-                <a:gd name="connsiteX50" fmla="*/ 790717 w 5324985"/>
-                <a:gd name="connsiteY50" fmla="*/ 1735723 h 3251912"/>
-                <a:gd name="connsiteX51" fmla="*/ 706488 w 5324985"/>
-                <a:gd name="connsiteY51" fmla="*/ 1598604 h 3251912"/>
-                <a:gd name="connsiteX52" fmla="*/ 618951 w 5324985"/>
-                <a:gd name="connsiteY52" fmla="*/ 1463802 h 3251912"/>
-                <a:gd name="connsiteX53" fmla="*/ 436273 w 5324985"/>
-                <a:gd name="connsiteY53" fmla="*/ 1195355 h 3251912"/>
-                <a:gd name="connsiteX54" fmla="*/ 346896 w 5324985"/>
-                <a:gd name="connsiteY54" fmla="*/ 1058816 h 3251912"/>
-                <a:gd name="connsiteX55" fmla="*/ 261809 w 5324985"/>
-                <a:gd name="connsiteY55" fmla="*/ 919264 h 3251912"/>
-                <a:gd name="connsiteX56" fmla="*/ 118487 w 5324985"/>
-                <a:gd name="connsiteY56" fmla="*/ 626498 h 3251912"/>
-                <a:gd name="connsiteX57" fmla="*/ 28130 w 5324985"/>
-                <a:gd name="connsiteY57" fmla="*/ 315781 h 3251912"/>
-                <a:gd name="connsiteX58" fmla="*/ 6751 w 5324985"/>
-                <a:gd name="connsiteY58" fmla="*/ 156195 h 3251912"/>
-              </a:gdLst>
-              <a:ahLst/>
-              <a:cxnLst>
-                <a:cxn ang="0">
-                  <a:pos x="connsiteX0" y="connsiteY0"/>
-                </a:cxn>
-                <a:cxn ang="0">
-                  <a:pos x="connsiteX1" y="connsiteY1"/>
-                </a:cxn>
-                <a:cxn ang="0">
-                  <a:pos x="connsiteX2" y="connsiteY2"/>
-                </a:cxn>
-                <a:cxn ang="0">
-                  <a:pos x="connsiteX3" y="connsiteY3"/>
-                </a:cxn>
-                <a:cxn ang="0">
-                  <a:pos x="connsiteX4" y="connsiteY4"/>
-                </a:cxn>
-                <a:cxn ang="0">
-                  <a:pos x="connsiteX5" y="connsiteY5"/>
-                </a:cxn>
-                <a:cxn ang="0">
-                  <a:pos x="connsiteX6" y="connsiteY6"/>
-                </a:cxn>
-                <a:cxn ang="0">
-                  <a:pos x="connsiteX7" y="connsiteY7"/>
-                </a:cxn>
-                <a:cxn ang="0">
-                  <a:pos x="connsiteX8" y="connsiteY8"/>
-                </a:cxn>
-                <a:cxn ang="0">
-                  <a:pos x="connsiteX9" y="connsiteY9"/>
-                </a:cxn>
-                <a:cxn ang="0">
-                  <a:pos x="connsiteX10" y="connsiteY10"/>
-                </a:cxn>
-                <a:cxn ang="0">
-                  <a:pos x="connsiteX11" y="connsiteY11"/>
-                </a:cxn>
-                <a:cxn ang="0">
-                  <a:pos x="connsiteX12" y="connsiteY12"/>
-                </a:cxn>
-                <a:cxn ang="0">
-                  <a:pos x="connsiteX13" y="connsiteY13"/>
-                </a:cxn>
-                <a:cxn ang="0">
-                  <a:pos x="connsiteX14" y="connsiteY14"/>
-                </a:cxn>
-                <a:cxn ang="0">
-                  <a:pos x="connsiteX15" y="connsiteY15"/>
-                </a:cxn>
-                <a:cxn ang="0">
-                  <a:pos x="connsiteX16" y="connsiteY16"/>
-                </a:cxn>
-                <a:cxn ang="0">
-                  <a:pos x="connsiteX17" y="connsiteY17"/>
-                </a:cxn>
-                <a:cxn ang="0">
-                  <a:pos x="connsiteX18" y="connsiteY18"/>
-                </a:cxn>
-                <a:cxn ang="0">
-                  <a:pos x="connsiteX19" y="connsiteY19"/>
-                </a:cxn>
-                <a:cxn ang="0">
-                  <a:pos x="connsiteX20" y="connsiteY20"/>
-                </a:cxn>
-                <a:cxn ang="0">
-                  <a:pos x="connsiteX21" y="connsiteY21"/>
-                </a:cxn>
-                <a:cxn ang="0">
-                  <a:pos x="connsiteX22" y="connsiteY22"/>
-                </a:cxn>
-                <a:cxn ang="0">
-                  <a:pos x="connsiteX23" y="connsiteY23"/>
-                </a:cxn>
-                <a:cxn ang="0">
-                  <a:pos x="connsiteX24" y="connsiteY24"/>
-                </a:cxn>
-                <a:cxn ang="0">
-                  <a:pos x="connsiteX25" y="connsiteY25"/>
-                </a:cxn>
-                <a:cxn ang="0">
-                  <a:pos x="connsiteX26" y="connsiteY26"/>
-                </a:cxn>
-                <a:cxn ang="0">
-                  <a:pos x="connsiteX27" y="connsiteY27"/>
-                </a:cxn>
-                <a:cxn ang="0">
-                  <a:pos x="connsiteX28" y="connsiteY28"/>
-                </a:cxn>
-                <a:cxn ang="0">
-                  <a:pos x="connsiteX29" y="connsiteY29"/>
-                </a:cxn>
-                <a:cxn ang="0">
-                  <a:pos x="connsiteX30" y="connsiteY30"/>
-                </a:cxn>
-                <a:cxn ang="0">
-                  <a:pos x="connsiteX31" y="connsiteY31"/>
-                </a:cxn>
-                <a:cxn ang="0">
-                  <a:pos x="connsiteX32" y="connsiteY32"/>
-                </a:cxn>
-                <a:cxn ang="0">
-                  <a:pos x="connsiteX33" y="connsiteY33"/>
-                </a:cxn>
-                <a:cxn ang="0">
-                  <a:pos x="connsiteX34" y="connsiteY34"/>
-                </a:cxn>
-                <a:cxn ang="0">
-                  <a:pos x="connsiteX35" y="connsiteY35"/>
-                </a:cxn>
-                <a:cxn ang="0">
-                  <a:pos x="connsiteX36" y="connsiteY36"/>
-                </a:cxn>
-                <a:cxn ang="0">
-                  <a:pos x="connsiteX37" y="connsiteY37"/>
-                </a:cxn>
-                <a:cxn ang="0">
-                  <a:pos x="connsiteX38" y="connsiteY38"/>
-                </a:cxn>
-                <a:cxn ang="0">
-                  <a:pos x="connsiteX39" y="connsiteY39"/>
-                </a:cxn>
-                <a:cxn ang="0">
-                  <a:pos x="connsiteX40" y="connsiteY40"/>
-                </a:cxn>
-                <a:cxn ang="0">
-                  <a:pos x="connsiteX41" y="connsiteY41"/>
-                </a:cxn>
-                <a:cxn ang="0">
-                  <a:pos x="connsiteX42" y="connsiteY42"/>
-                </a:cxn>
-                <a:cxn ang="0">
-                  <a:pos x="connsiteX43" y="connsiteY43"/>
-                </a:cxn>
-                <a:cxn ang="0">
-                  <a:pos x="connsiteX44" y="connsiteY44"/>
-                </a:cxn>
-                <a:cxn ang="0">
-                  <a:pos x="connsiteX45" y="connsiteY45"/>
-                </a:cxn>
-                <a:cxn ang="0">
-                  <a:pos x="connsiteX46" y="connsiteY46"/>
-                </a:cxn>
-                <a:cxn ang="0">
-                  <a:pos x="connsiteX47" y="connsiteY47"/>
-                </a:cxn>
-                <a:cxn ang="0">
-                  <a:pos x="connsiteX48" y="connsiteY48"/>
-                </a:cxn>
-                <a:cxn ang="0">
-                  <a:pos x="connsiteX49" y="connsiteY49"/>
-                </a:cxn>
-                <a:cxn ang="0">
-                  <a:pos x="connsiteX50" y="connsiteY50"/>
-                </a:cxn>
-                <a:cxn ang="0">
-                  <a:pos x="connsiteX51" y="connsiteY51"/>
-                </a:cxn>
-                <a:cxn ang="0">
-                  <a:pos x="connsiteX52" y="connsiteY52"/>
-                </a:cxn>
-                <a:cxn ang="0">
-                  <a:pos x="connsiteX53" y="connsiteY53"/>
-                </a:cxn>
-                <a:cxn ang="0">
-                  <a:pos x="connsiteX54" y="connsiteY54"/>
-                </a:cxn>
-                <a:cxn ang="0">
-                  <a:pos x="connsiteX55" y="connsiteY55"/>
-                </a:cxn>
-                <a:cxn ang="0">
-                  <a:pos x="connsiteX56" y="connsiteY56"/>
-                </a:cxn>
-                <a:cxn ang="0">
-                  <a:pos x="connsiteX57" y="connsiteY57"/>
-                </a:cxn>
-                <a:cxn ang="0">
-                  <a:pos x="connsiteX58" y="connsiteY58"/>
-                </a:cxn>
-              </a:cxnLst>
-              <a:rect l="l" t="t" r="r" b="b"/>
-              <a:pathLst>
-                <a:path w="5324985" h="3251912">
-                  <a:moveTo>
-                    <a:pt x="0" y="0"/>
-                  </a:moveTo>
-                  <a:lnTo>
-                    <a:pt x="36826" y="0"/>
-                  </a:lnTo>
-                  <a:lnTo>
-                    <a:pt x="45003" y="152909"/>
-                  </a:lnTo>
-                  <a:cubicBezTo>
-                    <a:pt x="50351" y="205154"/>
-                    <a:pt x="58290" y="257123"/>
-                    <a:pt x="68956" y="308600"/>
-                  </a:cubicBezTo>
-                  <a:cubicBezTo>
-                    <a:pt x="91393" y="411324"/>
-                    <a:pt x="123882" y="511847"/>
-                    <a:pt x="167774" y="607968"/>
-                  </a:cubicBezTo>
-                  <a:cubicBezTo>
-                    <a:pt x="178195" y="632173"/>
-                    <a:pt x="190333" y="655798"/>
-                    <a:pt x="201857" y="679539"/>
-                  </a:cubicBezTo>
-                  <a:cubicBezTo>
-                    <a:pt x="214363" y="702933"/>
-                    <a:pt x="226255" y="726557"/>
-                    <a:pt x="239741" y="749488"/>
-                  </a:cubicBezTo>
-                  <a:cubicBezTo>
-                    <a:pt x="265488" y="795812"/>
-                    <a:pt x="294176" y="840746"/>
-                    <a:pt x="323724" y="885101"/>
-                  </a:cubicBezTo>
-                  <a:cubicBezTo>
-                    <a:pt x="353149" y="929572"/>
-                    <a:pt x="384657" y="972885"/>
-                    <a:pt x="416412" y="1016081"/>
-                  </a:cubicBezTo>
-                  <a:cubicBezTo>
-                    <a:pt x="448655" y="1058931"/>
-                    <a:pt x="482127" y="1101202"/>
-                    <a:pt x="515719" y="1143356"/>
-                  </a:cubicBezTo>
-                  <a:cubicBezTo>
-                    <a:pt x="583027" y="1227782"/>
-                    <a:pt x="653402" y="1310470"/>
-                    <a:pt x="722427" y="1395127"/>
-                  </a:cubicBezTo>
-                  <a:cubicBezTo>
-                    <a:pt x="757123" y="1437282"/>
-                    <a:pt x="791697" y="1479783"/>
-                    <a:pt x="825780" y="1522749"/>
-                  </a:cubicBezTo>
-                  <a:cubicBezTo>
-                    <a:pt x="859742" y="1565367"/>
-                    <a:pt x="893457" y="1610649"/>
-                    <a:pt x="926314" y="1651992"/>
-                  </a:cubicBezTo>
-                  <a:cubicBezTo>
-                    <a:pt x="958927" y="1694379"/>
-                    <a:pt x="993132" y="1735492"/>
-                    <a:pt x="1026848" y="1776836"/>
-                  </a:cubicBezTo>
-                  <a:cubicBezTo>
-                    <a:pt x="1061545" y="1817485"/>
-                    <a:pt x="1095996" y="1858133"/>
-                    <a:pt x="1131918" y="1897393"/>
-                  </a:cubicBezTo>
-                  <a:cubicBezTo>
-                    <a:pt x="1203273" y="1976376"/>
-                    <a:pt x="1277447" y="2052463"/>
-                    <a:pt x="1354688" y="2124728"/>
-                  </a:cubicBezTo>
-                  <a:cubicBezTo>
-                    <a:pt x="1509411" y="2268911"/>
-                    <a:pt x="1676396" y="2397575"/>
-                    <a:pt x="1855027" y="2504236"/>
-                  </a:cubicBezTo>
-                  <a:cubicBezTo>
-                    <a:pt x="1944528" y="2557277"/>
-                    <a:pt x="2036357" y="2605917"/>
-                    <a:pt x="2131618" y="2646913"/>
-                  </a:cubicBezTo>
-                  <a:cubicBezTo>
-                    <a:pt x="2226267" y="2689068"/>
-                    <a:pt x="2323981" y="2724622"/>
-                    <a:pt x="2423534" y="2754732"/>
-                  </a:cubicBezTo>
-                  <a:cubicBezTo>
-                    <a:pt x="2523087" y="2784958"/>
-                    <a:pt x="2624602" y="2809394"/>
-                    <a:pt x="2727588" y="2829197"/>
-                  </a:cubicBezTo>
-                  <a:cubicBezTo>
-                    <a:pt x="2830698" y="2848653"/>
-                    <a:pt x="2935522" y="2861971"/>
-                    <a:pt x="3041083" y="2870890"/>
-                  </a:cubicBezTo>
-                  <a:cubicBezTo>
-                    <a:pt x="3146644" y="2879922"/>
-                    <a:pt x="3253307" y="2883860"/>
-                    <a:pt x="3360340" y="2883976"/>
-                  </a:cubicBezTo>
-                  <a:cubicBezTo>
-                    <a:pt x="3387067" y="2883976"/>
-                    <a:pt x="3414162" y="2884439"/>
-                    <a:pt x="3439663" y="2883396"/>
-                  </a:cubicBezTo>
-                  <a:lnTo>
-                    <a:pt x="3478529" y="2882471"/>
-                  </a:lnTo>
-                  <a:lnTo>
-                    <a:pt x="3517271" y="2880616"/>
-                  </a:lnTo>
-                  <a:cubicBezTo>
-                    <a:pt x="3568887" y="2878417"/>
-                    <a:pt x="3620257" y="2873552"/>
-                    <a:pt x="3671260" y="2867878"/>
-                  </a:cubicBezTo>
-                  <a:cubicBezTo>
-                    <a:pt x="3875515" y="2844253"/>
-                    <a:pt x="4074253" y="2792486"/>
-                    <a:pt x="4265268" y="2716283"/>
-                  </a:cubicBezTo>
-                  <a:cubicBezTo>
-                    <a:pt x="4361020" y="2678529"/>
-                    <a:pt x="4454444" y="2633710"/>
-                    <a:pt x="4546395" y="2584724"/>
-                  </a:cubicBezTo>
-                  <a:cubicBezTo>
-                    <a:pt x="4638470" y="2535967"/>
-                    <a:pt x="4728827" y="2481885"/>
-                    <a:pt x="4817837" y="2424674"/>
-                  </a:cubicBezTo>
-                  <a:cubicBezTo>
-                    <a:pt x="4906846" y="2367348"/>
-                    <a:pt x="4994385" y="2306317"/>
-                    <a:pt x="5081677" y="2243548"/>
-                  </a:cubicBezTo>
-                  <a:cubicBezTo>
-                    <a:pt x="5125201" y="2212164"/>
-                    <a:pt x="5168603" y="2179969"/>
-                    <a:pt x="5211881" y="2147658"/>
-                  </a:cubicBezTo>
-                  <a:lnTo>
-                    <a:pt x="5324985" y="2062128"/>
-                  </a:lnTo>
-                  <a:lnTo>
-                    <a:pt x="5324985" y="2514993"/>
-                  </a:lnTo>
-                  <a:lnTo>
-                    <a:pt x="5314867" y="2522881"/>
-                  </a:lnTo>
-                  <a:cubicBezTo>
-                    <a:pt x="5225490" y="2591325"/>
-                    <a:pt x="5133783" y="2658379"/>
-                    <a:pt x="5038276" y="2722421"/>
-                  </a:cubicBezTo>
-                  <a:cubicBezTo>
-                    <a:pt x="4942892" y="2786348"/>
-                    <a:pt x="4844810" y="2848422"/>
-                    <a:pt x="4741701" y="2904937"/>
-                  </a:cubicBezTo>
-                  <a:cubicBezTo>
-                    <a:pt x="4638592" y="2961337"/>
-                    <a:pt x="4531929" y="3013683"/>
-                    <a:pt x="4420728" y="3058848"/>
-                  </a:cubicBezTo>
-                  <a:cubicBezTo>
-                    <a:pt x="4199063" y="3150338"/>
-                    <a:pt x="3959621" y="3211485"/>
-                    <a:pt x="3717481" y="3237079"/>
-                  </a:cubicBezTo>
-                  <a:cubicBezTo>
-                    <a:pt x="3656914" y="3243101"/>
-                    <a:pt x="3596227" y="3247966"/>
-                    <a:pt x="3535661" y="3249934"/>
-                  </a:cubicBezTo>
-                  <a:lnTo>
-                    <a:pt x="3490175" y="3251555"/>
-                  </a:lnTo>
-                  <a:lnTo>
-                    <a:pt x="3444813" y="3251787"/>
-                  </a:lnTo>
-                  <a:cubicBezTo>
-                    <a:pt x="3414162" y="3252250"/>
-                    <a:pt x="3385105" y="3251324"/>
-                    <a:pt x="3355681" y="3250745"/>
-                  </a:cubicBezTo>
-                  <a:cubicBezTo>
-                    <a:pt x="3296954" y="3250050"/>
-                    <a:pt x="3237860" y="3246692"/>
-                    <a:pt x="3179011" y="3243795"/>
-                  </a:cubicBezTo>
-                  <a:cubicBezTo>
-                    <a:pt x="3120039" y="3239164"/>
-                    <a:pt x="3061067" y="3234878"/>
-                    <a:pt x="3002217" y="3227814"/>
-                  </a:cubicBezTo>
-                  <a:cubicBezTo>
-                    <a:pt x="2884397" y="3214496"/>
-                    <a:pt x="2766699" y="3196314"/>
-                    <a:pt x="2650103" y="3170836"/>
-                  </a:cubicBezTo>
-                  <a:cubicBezTo>
-                    <a:pt x="2533510" y="3145358"/>
-                    <a:pt x="2418263" y="3112583"/>
-                    <a:pt x="2305836" y="3072514"/>
-                  </a:cubicBezTo>
-                  <a:cubicBezTo>
-                    <a:pt x="2193410" y="3032328"/>
-                    <a:pt x="2083926" y="2984383"/>
-                    <a:pt x="1978611" y="2929952"/>
-                  </a:cubicBezTo>
-                  <a:cubicBezTo>
-                    <a:pt x="1873663" y="2874711"/>
-                    <a:pt x="1772884" y="2812985"/>
-                    <a:pt x="1678235" y="2744424"/>
-                  </a:cubicBezTo>
-                  <a:cubicBezTo>
-                    <a:pt x="1488201" y="2608001"/>
-                    <a:pt x="1321708" y="2448068"/>
-                    <a:pt x="1175688" y="2277018"/>
-                  </a:cubicBezTo>
-                  <a:cubicBezTo>
-                    <a:pt x="1102985" y="2191086"/>
-                    <a:pt x="1035309" y="2102377"/>
-                    <a:pt x="971310" y="2012044"/>
-                  </a:cubicBezTo>
-                  <a:cubicBezTo>
-                    <a:pt x="907188" y="1921714"/>
-                    <a:pt x="847358" y="1829413"/>
-                    <a:pt x="790717" y="1735723"/>
-                  </a:cubicBezTo>
-                  <a:cubicBezTo>
-                    <a:pt x="761782" y="1688357"/>
-                    <a:pt x="735300" y="1644002"/>
-                    <a:pt x="706488" y="1598604"/>
-                  </a:cubicBezTo>
-                  <a:cubicBezTo>
-                    <a:pt x="677922" y="1553555"/>
-                    <a:pt x="648866" y="1508505"/>
-                    <a:pt x="618951" y="1463802"/>
-                  </a:cubicBezTo>
-                  <a:lnTo>
-                    <a:pt x="436273" y="1195355"/>
-                  </a:lnTo>
-                  <a:cubicBezTo>
-                    <a:pt x="405990" y="1150189"/>
-                    <a:pt x="376075" y="1104792"/>
-                    <a:pt x="346896" y="1058816"/>
-                  </a:cubicBezTo>
-                  <a:cubicBezTo>
-                    <a:pt x="317716" y="1012838"/>
-                    <a:pt x="288782" y="966747"/>
-                    <a:pt x="261809" y="919264"/>
-                  </a:cubicBezTo>
-                  <a:cubicBezTo>
-                    <a:pt x="207742" y="824764"/>
-                    <a:pt x="158088" y="727485"/>
-                    <a:pt x="118487" y="626498"/>
-                  </a:cubicBezTo>
-                  <a:cubicBezTo>
-                    <a:pt x="78151" y="525859"/>
-                    <a:pt x="48237" y="421515"/>
-                    <a:pt x="28130" y="315781"/>
-                  </a:cubicBezTo>
-                  <a:cubicBezTo>
-                    <a:pt x="18506" y="262914"/>
-                    <a:pt x="11425" y="209642"/>
-                    <a:pt x="6751" y="156195"/>
-                  </a:cubicBezTo>
-                  <a:close/>
-                </a:path>
-              </a:pathLst>
-            </a:custGeom>
-            <a:gradFill>
-              <a:gsLst>
-                <a:gs pos="2000">
-                  <a:schemeClr val="bg1">
-                    <a:alpha val="10000"/>
-                  </a:schemeClr>
-                </a:gs>
-                <a:gs pos="16000">
-                  <a:schemeClr val="accent6">
-                    <a:alpha val="10000"/>
-                  </a:schemeClr>
-                </a:gs>
-                <a:gs pos="100000">
-                  <a:schemeClr val="bg1">
-                    <a:alpha val="10000"/>
-                  </a:schemeClr>
-                </a:gs>
-                <a:gs pos="85000">
-                  <a:schemeClr val="accent1">
-                    <a:alpha val="10000"/>
-                  </a:schemeClr>
-                </a:gs>
-              </a:gsLst>
-              <a:lin ang="12000000" scaled="0"/>
-            </a:gradFill>
-            <a:ln>
-              <a:noFill/>
-            </a:ln>
-          </p:spPr>
-          <p:style>
-            <a:lnRef idx="2">
-              <a:schemeClr val="accent1">
-                <a:shade val="50000"/>
-              </a:schemeClr>
-            </a:lnRef>
-            <a:fillRef idx="1">
-              <a:schemeClr val="accent1"/>
-            </a:fillRef>
-            <a:effectRef idx="0">
-              <a:schemeClr val="accent1"/>
-            </a:effectRef>
-            <a:fontRef idx="minor">
-              <a:schemeClr val="lt1"/>
-            </a:fontRef>
-          </p:style>
-          <p:txBody>
-            <a:bodyPr rtlCol="0" anchor="ctr"/>
-            <a:lstStyle/>
-            <a:p>
-              <a:pPr algn="ctr"/>
-              <a:endParaRPr lang="en-US"/>
-            </a:p>
-          </p:txBody>
-        </p:sp>
-        <p:sp>
-          <p:nvSpPr>
-            <p:cNvPr id="40" name="Freeform: Shape 39">
-              <a:extLst>
-                <a:ext uri="{FF2B5EF4-FFF2-40B4-BE49-F238E27FC236}">
-                  <a16:creationId xmlns:a16="http://schemas.microsoft.com/office/drawing/2014/main" id="{64AC8CFC-1164-4525-82A0-25F75ADCF4CD}"/>
-                </a:ext>
-                <a:ext uri="{C183D7F6-B498-43B3-948B-1728B52AA6E4}">
-                  <adec:decorative xmlns:adec="http://schemas.microsoft.com/office/drawing/2017/decorative" val="1"/>
-                </a:ext>
-              </a:extLst>
-            </p:cNvPr>
-            <p:cNvSpPr/>
-            <p:nvPr>
-              <p:extLst>
-                <p:ext uri="{386F3935-93C4-4BCD-93E2-E3B085C9AB24}">
-                  <p16:designElem xmlns:p16="http://schemas.microsoft.com/office/powerpoint/2015/main" val="1"/>
-                </p:ext>
-              </p:extLst>
-            </p:nvPr>
-          </p:nvSpPr>
-          <p:spPr>
-            <a:xfrm>
-              <a:off x="6916467" y="-1"/>
-              <a:ext cx="5275533" cy="2980757"/>
-            </a:xfrm>
-            <a:custGeom>
-              <a:avLst/>
-              <a:gdLst>
-                <a:gd name="connsiteX0" fmla="*/ 0 w 5275533"/>
-                <a:gd name="connsiteY0" fmla="*/ 0 h 2980757"/>
-                <a:gd name="connsiteX1" fmla="*/ 201166 w 5275533"/>
-                <a:gd name="connsiteY1" fmla="*/ 0 h 2980757"/>
-                <a:gd name="connsiteX2" fmla="*/ 206734 w 5275533"/>
-                <a:gd name="connsiteY2" fmla="*/ 89286 h 2980757"/>
-                <a:gd name="connsiteX3" fmla="*/ 232051 w 5275533"/>
-                <a:gd name="connsiteY3" fmla="*/ 226897 h 2980757"/>
-                <a:gd name="connsiteX4" fmla="*/ 332707 w 5275533"/>
-                <a:gd name="connsiteY4" fmla="*/ 487120 h 2980757"/>
-                <a:gd name="connsiteX5" fmla="*/ 402959 w 5275533"/>
-                <a:gd name="connsiteY5" fmla="*/ 609647 h 2980757"/>
-                <a:gd name="connsiteX6" fmla="*/ 483631 w 5275533"/>
-                <a:gd name="connsiteY6" fmla="*/ 728236 h 2980757"/>
-                <a:gd name="connsiteX7" fmla="*/ 669986 w 5275533"/>
-                <a:gd name="connsiteY7" fmla="*/ 957424 h 2980757"/>
-                <a:gd name="connsiteX8" fmla="*/ 871667 w 5275533"/>
-                <a:gd name="connsiteY8" fmla="*/ 1188348 h 2980757"/>
-                <a:gd name="connsiteX9" fmla="*/ 971956 w 5275533"/>
-                <a:gd name="connsiteY9" fmla="*/ 1308905 h 2980757"/>
-                <a:gd name="connsiteX10" fmla="*/ 1020139 w 5275533"/>
-                <a:gd name="connsiteY10" fmla="*/ 1368084 h 2980757"/>
-                <a:gd name="connsiteX11" fmla="*/ 1067340 w 5275533"/>
-                <a:gd name="connsiteY11" fmla="*/ 1424715 h 2980757"/>
-                <a:gd name="connsiteX12" fmla="*/ 1472909 w 5275533"/>
-                <a:gd name="connsiteY12" fmla="*/ 1843252 h 2980757"/>
-                <a:gd name="connsiteX13" fmla="*/ 1688567 w 5275533"/>
-                <a:gd name="connsiteY13" fmla="*/ 2031559 h 2980757"/>
-                <a:gd name="connsiteX14" fmla="*/ 1914401 w 5275533"/>
-                <a:gd name="connsiteY14" fmla="*/ 2205156 h 2980757"/>
-                <a:gd name="connsiteX15" fmla="*/ 2418909 w 5275533"/>
-                <a:gd name="connsiteY15" fmla="*/ 2479741 h 2980757"/>
-                <a:gd name="connsiteX16" fmla="*/ 2701141 w 5275533"/>
-                <a:gd name="connsiteY16" fmla="*/ 2557333 h 2980757"/>
-                <a:gd name="connsiteX17" fmla="*/ 2773475 w 5275533"/>
-                <a:gd name="connsiteY17" fmla="*/ 2570999 h 2980757"/>
-                <a:gd name="connsiteX18" fmla="*/ 2846424 w 5275533"/>
-                <a:gd name="connsiteY18" fmla="*/ 2582465 h 2980757"/>
-                <a:gd name="connsiteX19" fmla="*/ 2993669 w 5275533"/>
-                <a:gd name="connsiteY19" fmla="*/ 2598909 h 2980757"/>
-                <a:gd name="connsiteX20" fmla="*/ 3067721 w 5275533"/>
-                <a:gd name="connsiteY20" fmla="*/ 2604237 h 2980757"/>
-                <a:gd name="connsiteX21" fmla="*/ 3142019 w 5275533"/>
-                <a:gd name="connsiteY21" fmla="*/ 2607943 h 2980757"/>
-                <a:gd name="connsiteX22" fmla="*/ 3216561 w 5275533"/>
-                <a:gd name="connsiteY22" fmla="*/ 2609564 h 2980757"/>
-                <a:gd name="connsiteX23" fmla="*/ 3291225 w 5275533"/>
-                <a:gd name="connsiteY23" fmla="*/ 2609217 h 2980757"/>
-                <a:gd name="connsiteX24" fmla="*/ 3328619 w 5275533"/>
-                <a:gd name="connsiteY24" fmla="*/ 2608869 h 2980757"/>
-                <a:gd name="connsiteX25" fmla="*/ 3364665 w 5275533"/>
-                <a:gd name="connsiteY25" fmla="*/ 2607363 h 2980757"/>
-                <a:gd name="connsiteX26" fmla="*/ 3400587 w 5275533"/>
-                <a:gd name="connsiteY26" fmla="*/ 2605627 h 2980757"/>
-                <a:gd name="connsiteX27" fmla="*/ 3436387 w 5275533"/>
-                <a:gd name="connsiteY27" fmla="*/ 2602847 h 2980757"/>
-                <a:gd name="connsiteX28" fmla="*/ 3578361 w 5275533"/>
-                <a:gd name="connsiteY28" fmla="*/ 2586286 h 2980757"/>
-                <a:gd name="connsiteX29" fmla="*/ 4119159 w 5275533"/>
-                <a:gd name="connsiteY29" fmla="*/ 2418594 h 2980757"/>
-                <a:gd name="connsiteX30" fmla="*/ 4618765 w 5275533"/>
-                <a:gd name="connsiteY30" fmla="*/ 2124668 h 2980757"/>
-                <a:gd name="connsiteX31" fmla="*/ 4739895 w 5275533"/>
-                <a:gd name="connsiteY31" fmla="*/ 2038275 h 2980757"/>
-                <a:gd name="connsiteX32" fmla="*/ 4861027 w 5275533"/>
-                <a:gd name="connsiteY32" fmla="*/ 1948986 h 2980757"/>
-                <a:gd name="connsiteX33" fmla="*/ 5106354 w 5275533"/>
-                <a:gd name="connsiteY33" fmla="*/ 1763690 h 2980757"/>
-                <a:gd name="connsiteX34" fmla="*/ 5275533 w 5275533"/>
-                <a:gd name="connsiteY34" fmla="*/ 1641017 h 2980757"/>
-                <a:gd name="connsiteX35" fmla="*/ 5275533 w 5275533"/>
-                <a:gd name="connsiteY35" fmla="*/ 2257481 h 2980757"/>
-                <a:gd name="connsiteX36" fmla="*/ 5168881 w 5275533"/>
-                <a:gd name="connsiteY36" fmla="*/ 2332084 h 2980757"/>
-                <a:gd name="connsiteX37" fmla="*/ 5036225 w 5275533"/>
-                <a:gd name="connsiteY37" fmla="*/ 2421489 h 2980757"/>
-                <a:gd name="connsiteX38" fmla="*/ 4899401 w 5275533"/>
-                <a:gd name="connsiteY38" fmla="*/ 2508347 h 2980757"/>
-                <a:gd name="connsiteX39" fmla="*/ 4612145 w 5275533"/>
-                <a:gd name="connsiteY39" fmla="*/ 2671407 h 2980757"/>
-                <a:gd name="connsiteX40" fmla="*/ 4303187 w 5275533"/>
-                <a:gd name="connsiteY40" fmla="*/ 2810030 h 2980757"/>
-                <a:gd name="connsiteX41" fmla="*/ 3630835 w 5275533"/>
-                <a:gd name="connsiteY41" fmla="*/ 2969500 h 2980757"/>
-                <a:gd name="connsiteX42" fmla="*/ 3457719 w 5275533"/>
-                <a:gd name="connsiteY42" fmla="*/ 2979808 h 2980757"/>
-                <a:gd name="connsiteX43" fmla="*/ 3414441 w 5275533"/>
-                <a:gd name="connsiteY43" fmla="*/ 2980733 h 2980757"/>
-                <a:gd name="connsiteX44" fmla="*/ 3371285 w 5275533"/>
-                <a:gd name="connsiteY44" fmla="*/ 2980502 h 2980757"/>
-                <a:gd name="connsiteX45" fmla="*/ 3328252 w 5275533"/>
-                <a:gd name="connsiteY45" fmla="*/ 2980039 h 2980757"/>
-                <a:gd name="connsiteX46" fmla="*/ 3286445 w 5275533"/>
-                <a:gd name="connsiteY46" fmla="*/ 2978534 h 2980757"/>
-                <a:gd name="connsiteX47" fmla="*/ 2952475 w 5275533"/>
-                <a:gd name="connsiteY47" fmla="*/ 2953402 h 2980757"/>
-                <a:gd name="connsiteX48" fmla="*/ 2620591 w 5275533"/>
-                <a:gd name="connsiteY48" fmla="*/ 2898046 h 2980757"/>
-                <a:gd name="connsiteX49" fmla="*/ 2294591 w 5275533"/>
-                <a:gd name="connsiteY49" fmla="*/ 2811305 h 2980757"/>
-                <a:gd name="connsiteX50" fmla="*/ 1670544 w 5275533"/>
-                <a:gd name="connsiteY50" fmla="*/ 2550501 h 2980757"/>
-                <a:gd name="connsiteX51" fmla="*/ 1144703 w 5275533"/>
-                <a:gd name="connsiteY51" fmla="*/ 2144472 h 2980757"/>
-                <a:gd name="connsiteX52" fmla="*/ 931497 w 5275533"/>
-                <a:gd name="connsiteY52" fmla="*/ 1900114 h 2980757"/>
-                <a:gd name="connsiteX53" fmla="*/ 745265 w 5275533"/>
-                <a:gd name="connsiteY53" fmla="*/ 1641395 h 2980757"/>
-                <a:gd name="connsiteX54" fmla="*/ 701741 w 5275533"/>
-                <a:gd name="connsiteY54" fmla="*/ 1575500 h 2980757"/>
-                <a:gd name="connsiteX55" fmla="*/ 660178 w 5275533"/>
-                <a:gd name="connsiteY55" fmla="*/ 1511573 h 2980757"/>
-                <a:gd name="connsiteX56" fmla="*/ 578158 w 5275533"/>
-                <a:gd name="connsiteY56" fmla="*/ 1387656 h 2980757"/>
-                <a:gd name="connsiteX57" fmla="*/ 408230 w 5275533"/>
-                <a:gd name="connsiteY57" fmla="*/ 1134497 h 2980757"/>
-                <a:gd name="connsiteX58" fmla="*/ 242349 w 5275533"/>
-                <a:gd name="connsiteY58" fmla="*/ 866860 h 2980757"/>
-                <a:gd name="connsiteX59" fmla="*/ 167562 w 5275533"/>
-                <a:gd name="connsiteY59" fmla="*/ 724994 h 2980757"/>
-                <a:gd name="connsiteX60" fmla="*/ 104054 w 5275533"/>
-                <a:gd name="connsiteY60" fmla="*/ 576525 h 2980757"/>
-                <a:gd name="connsiteX61" fmla="*/ 55381 w 5275533"/>
-                <a:gd name="connsiteY61" fmla="*/ 422499 h 2980757"/>
-                <a:gd name="connsiteX62" fmla="*/ 37236 w 5275533"/>
-                <a:gd name="connsiteY62" fmla="*/ 343980 h 2980757"/>
-                <a:gd name="connsiteX63" fmla="*/ 29267 w 5275533"/>
-                <a:gd name="connsiteY63" fmla="*/ 304604 h 2980757"/>
-                <a:gd name="connsiteX64" fmla="*/ 22646 w 5275533"/>
-                <a:gd name="connsiteY64" fmla="*/ 265113 h 2980757"/>
-                <a:gd name="connsiteX65" fmla="*/ 3903 w 5275533"/>
-                <a:gd name="connsiteY65" fmla="*/ 106787 h 2980757"/>
-              </a:gdLst>
-              <a:ahLst/>
-              <a:cxnLst>
-                <a:cxn ang="0">
-                  <a:pos x="connsiteX0" y="connsiteY0"/>
-                </a:cxn>
-                <a:cxn ang="0">
-                  <a:pos x="connsiteX1" y="connsiteY1"/>
-                </a:cxn>
-                <a:cxn ang="0">
-                  <a:pos x="connsiteX2" y="connsiteY2"/>
-                </a:cxn>
-                <a:cxn ang="0">
-                  <a:pos x="connsiteX3" y="connsiteY3"/>
-                </a:cxn>
-                <a:cxn ang="0">
-                  <a:pos x="connsiteX4" y="connsiteY4"/>
-                </a:cxn>
-                <a:cxn ang="0">
-                  <a:pos x="connsiteX5" y="connsiteY5"/>
-                </a:cxn>
-                <a:cxn ang="0">
-                  <a:pos x="connsiteX6" y="connsiteY6"/>
-                </a:cxn>
-                <a:cxn ang="0">
-                  <a:pos x="connsiteX7" y="connsiteY7"/>
-                </a:cxn>
-                <a:cxn ang="0">
-                  <a:pos x="connsiteX8" y="connsiteY8"/>
-                </a:cxn>
-                <a:cxn ang="0">
-                  <a:pos x="connsiteX9" y="connsiteY9"/>
-                </a:cxn>
-                <a:cxn ang="0">
-                  <a:pos x="connsiteX10" y="connsiteY10"/>
-                </a:cxn>
-                <a:cxn ang="0">
-                  <a:pos x="connsiteX11" y="connsiteY11"/>
-                </a:cxn>
-                <a:cxn ang="0">
-                  <a:pos x="connsiteX12" y="connsiteY12"/>
-                </a:cxn>
-                <a:cxn ang="0">
-                  <a:pos x="connsiteX13" y="connsiteY13"/>
-                </a:cxn>
-                <a:cxn ang="0">
-                  <a:pos x="connsiteX14" y="connsiteY14"/>
-                </a:cxn>
-                <a:cxn ang="0">
-                  <a:pos x="connsiteX15" y="connsiteY15"/>
-                </a:cxn>
-                <a:cxn ang="0">
-                  <a:pos x="connsiteX16" y="connsiteY16"/>
-                </a:cxn>
-                <a:cxn ang="0">
-                  <a:pos x="connsiteX17" y="connsiteY17"/>
-                </a:cxn>
-                <a:cxn ang="0">
-                  <a:pos x="connsiteX18" y="connsiteY18"/>
-                </a:cxn>
-                <a:cxn ang="0">
-                  <a:pos x="connsiteX19" y="connsiteY19"/>
-                </a:cxn>
-                <a:cxn ang="0">
-                  <a:pos x="connsiteX20" y="connsiteY20"/>
-                </a:cxn>
-                <a:cxn ang="0">
-                  <a:pos x="connsiteX21" y="connsiteY21"/>
-                </a:cxn>
-                <a:cxn ang="0">
-                  <a:pos x="connsiteX22" y="connsiteY22"/>
-                </a:cxn>
-                <a:cxn ang="0">
-                  <a:pos x="connsiteX23" y="connsiteY23"/>
-                </a:cxn>
-                <a:cxn ang="0">
-                  <a:pos x="connsiteX24" y="connsiteY24"/>
-                </a:cxn>
-                <a:cxn ang="0">
-                  <a:pos x="connsiteX25" y="connsiteY25"/>
-                </a:cxn>
-                <a:cxn ang="0">
-                  <a:pos x="connsiteX26" y="connsiteY26"/>
-                </a:cxn>
-                <a:cxn ang="0">
-                  <a:pos x="connsiteX27" y="connsiteY27"/>
-                </a:cxn>
-                <a:cxn ang="0">
-                  <a:pos x="connsiteX28" y="connsiteY28"/>
-                </a:cxn>
-                <a:cxn ang="0">
-                  <a:pos x="connsiteX29" y="connsiteY29"/>
-                </a:cxn>
-                <a:cxn ang="0">
-                  <a:pos x="connsiteX30" y="connsiteY30"/>
-                </a:cxn>
-                <a:cxn ang="0">
-                  <a:pos x="connsiteX31" y="connsiteY31"/>
-                </a:cxn>
-                <a:cxn ang="0">
-                  <a:pos x="connsiteX32" y="connsiteY32"/>
-                </a:cxn>
-                <a:cxn ang="0">
-                  <a:pos x="connsiteX33" y="connsiteY33"/>
-                </a:cxn>
-                <a:cxn ang="0">
-                  <a:pos x="connsiteX34" y="connsiteY34"/>
-                </a:cxn>
-                <a:cxn ang="0">
-                  <a:pos x="connsiteX35" y="connsiteY35"/>
-                </a:cxn>
-                <a:cxn ang="0">
-                  <a:pos x="connsiteX36" y="connsiteY36"/>
-                </a:cxn>
-                <a:cxn ang="0">
-                  <a:pos x="connsiteX37" y="connsiteY37"/>
-                </a:cxn>
-                <a:cxn ang="0">
-                  <a:pos x="connsiteX38" y="connsiteY38"/>
-                </a:cxn>
-                <a:cxn ang="0">
-                  <a:pos x="connsiteX39" y="connsiteY39"/>
-                </a:cxn>
-                <a:cxn ang="0">
-                  <a:pos x="connsiteX40" y="connsiteY40"/>
-                </a:cxn>
-                <a:cxn ang="0">
-                  <a:pos x="connsiteX41" y="connsiteY41"/>
-                </a:cxn>
-                <a:cxn ang="0">
-                  <a:pos x="connsiteX42" y="connsiteY42"/>
-                </a:cxn>
-                <a:cxn ang="0">
-                  <a:pos x="connsiteX43" y="connsiteY43"/>
-                </a:cxn>
-                <a:cxn ang="0">
-                  <a:pos x="connsiteX44" y="connsiteY44"/>
-                </a:cxn>
-                <a:cxn ang="0">
-                  <a:pos x="connsiteX45" y="connsiteY45"/>
-                </a:cxn>
-                <a:cxn ang="0">
-                  <a:pos x="connsiteX46" y="connsiteY46"/>
-                </a:cxn>
-                <a:cxn ang="0">
-                  <a:pos x="connsiteX47" y="connsiteY47"/>
-                </a:cxn>
-                <a:cxn ang="0">
-                  <a:pos x="connsiteX48" y="connsiteY48"/>
-                </a:cxn>
-                <a:cxn ang="0">
-                  <a:pos x="connsiteX49" y="connsiteY49"/>
-                </a:cxn>
-                <a:cxn ang="0">
-                  <a:pos x="connsiteX50" y="connsiteY50"/>
-                </a:cxn>
-                <a:cxn ang="0">
-                  <a:pos x="connsiteX51" y="connsiteY51"/>
-                </a:cxn>
-                <a:cxn ang="0">
-                  <a:pos x="connsiteX52" y="connsiteY52"/>
-                </a:cxn>
-                <a:cxn ang="0">
-                  <a:pos x="connsiteX53" y="connsiteY53"/>
-                </a:cxn>
-                <a:cxn ang="0">
-                  <a:pos x="connsiteX54" y="connsiteY54"/>
-                </a:cxn>
-                <a:cxn ang="0">
-                  <a:pos x="connsiteX55" y="connsiteY55"/>
-                </a:cxn>
-                <a:cxn ang="0">
-                  <a:pos x="connsiteX56" y="connsiteY56"/>
-                </a:cxn>
-                <a:cxn ang="0">
-                  <a:pos x="connsiteX57" y="connsiteY57"/>
-                </a:cxn>
-                <a:cxn ang="0">
-                  <a:pos x="connsiteX58" y="connsiteY58"/>
-                </a:cxn>
-                <a:cxn ang="0">
-                  <a:pos x="connsiteX59" y="connsiteY59"/>
-                </a:cxn>
-                <a:cxn ang="0">
-                  <a:pos x="connsiteX60" y="connsiteY60"/>
-                </a:cxn>
-                <a:cxn ang="0">
-                  <a:pos x="connsiteX61" y="connsiteY61"/>
-                </a:cxn>
-                <a:cxn ang="0">
-                  <a:pos x="connsiteX62" y="connsiteY62"/>
-                </a:cxn>
-                <a:cxn ang="0">
-                  <a:pos x="connsiteX63" y="connsiteY63"/>
-                </a:cxn>
-                <a:cxn ang="0">
-                  <a:pos x="connsiteX64" y="connsiteY64"/>
-                </a:cxn>
-                <a:cxn ang="0">
-                  <a:pos x="connsiteX65" y="connsiteY65"/>
-                </a:cxn>
-              </a:cxnLst>
-              <a:rect l="l" t="t" r="r" b="b"/>
-              <a:pathLst>
-                <a:path w="5275533" h="2980757">
-                  <a:moveTo>
-                    <a:pt x="0" y="0"/>
-                  </a:moveTo>
-                  <a:lnTo>
-                    <a:pt x="201166" y="0"/>
-                  </a:lnTo>
-                  <a:lnTo>
-                    <a:pt x="206734" y="89286"/>
-                  </a:lnTo>
-                  <a:cubicBezTo>
-                    <a:pt x="212220" y="135755"/>
-                    <a:pt x="220465" y="181731"/>
-                    <a:pt x="232051" y="226897"/>
-                  </a:cubicBezTo>
-                  <a:cubicBezTo>
-                    <a:pt x="254855" y="317344"/>
-                    <a:pt x="290287" y="403854"/>
-                    <a:pt x="332707" y="487120"/>
-                  </a:cubicBezTo>
-                  <a:cubicBezTo>
-                    <a:pt x="354163" y="528696"/>
-                    <a:pt x="377948" y="569461"/>
-                    <a:pt x="402959" y="609647"/>
-                  </a:cubicBezTo>
-                  <a:cubicBezTo>
-                    <a:pt x="428337" y="649717"/>
-                    <a:pt x="455433" y="689209"/>
-                    <a:pt x="483631" y="728236"/>
-                  </a:cubicBezTo>
-                  <a:cubicBezTo>
-                    <a:pt x="540764" y="806061"/>
-                    <a:pt x="604271" y="881569"/>
-                    <a:pt x="669986" y="957424"/>
-                  </a:cubicBezTo>
-                  <a:cubicBezTo>
-                    <a:pt x="735701" y="1033395"/>
-                    <a:pt x="804359" y="1109366"/>
-                    <a:pt x="871667" y="1188348"/>
-                  </a:cubicBezTo>
-                  <a:cubicBezTo>
-                    <a:pt x="905383" y="1227723"/>
-                    <a:pt x="938731" y="1268025"/>
-                    <a:pt x="971956" y="1308905"/>
-                  </a:cubicBezTo>
-                  <a:lnTo>
-                    <a:pt x="1020139" y="1368084"/>
-                  </a:lnTo>
-                  <a:cubicBezTo>
-                    <a:pt x="1035954" y="1386962"/>
-                    <a:pt x="1051035" y="1406302"/>
-                    <a:pt x="1067340" y="1424715"/>
-                  </a:cubicBezTo>
-                  <a:cubicBezTo>
-                    <a:pt x="1194602" y="1574573"/>
-                    <a:pt x="1332652" y="1712503"/>
-                    <a:pt x="1472909" y="1843252"/>
-                  </a:cubicBezTo>
-                  <a:cubicBezTo>
-                    <a:pt x="1543406" y="1908337"/>
-                    <a:pt x="1615128" y="1971221"/>
-                    <a:pt x="1688567" y="2031559"/>
-                  </a:cubicBezTo>
-                  <a:cubicBezTo>
-                    <a:pt x="1762006" y="2091895"/>
-                    <a:pt x="1836793" y="2150263"/>
-                    <a:pt x="1914401" y="2205156"/>
-                  </a:cubicBezTo>
-                  <a:cubicBezTo>
-                    <a:pt x="2069003" y="2315176"/>
-                    <a:pt x="2235742" y="2413498"/>
-                    <a:pt x="2418909" y="2479741"/>
-                  </a:cubicBezTo>
-                  <a:cubicBezTo>
-                    <a:pt x="2510249" y="2512863"/>
-                    <a:pt x="2604898" y="2538225"/>
-                    <a:pt x="2701141" y="2557333"/>
-                  </a:cubicBezTo>
-                  <a:cubicBezTo>
-                    <a:pt x="2725293" y="2561850"/>
-                    <a:pt x="2749201" y="2567062"/>
-                    <a:pt x="2773475" y="2570999"/>
-                  </a:cubicBezTo>
-                  <a:lnTo>
-                    <a:pt x="2846424" y="2582465"/>
-                  </a:lnTo>
-                  <a:cubicBezTo>
-                    <a:pt x="2895343" y="2588602"/>
-                    <a:pt x="2944261" y="2595088"/>
-                    <a:pt x="2993669" y="2598909"/>
-                  </a:cubicBezTo>
-                  <a:cubicBezTo>
-                    <a:pt x="3018313" y="2601110"/>
-                    <a:pt x="3042956" y="2603195"/>
-                    <a:pt x="3067721" y="2604237"/>
-                  </a:cubicBezTo>
-                  <a:cubicBezTo>
-                    <a:pt x="3092487" y="2605394"/>
-                    <a:pt x="3117130" y="2607247"/>
-                    <a:pt x="3142019" y="2607943"/>
-                  </a:cubicBezTo>
-                  <a:lnTo>
-                    <a:pt x="3216561" y="2609564"/>
-                  </a:lnTo>
-                  <a:cubicBezTo>
-                    <a:pt x="3241326" y="2610142"/>
-                    <a:pt x="3266337" y="2609333"/>
-                    <a:pt x="3291225" y="2609217"/>
-                  </a:cubicBezTo>
-                  <a:lnTo>
-                    <a:pt x="3328619" y="2608869"/>
-                  </a:lnTo>
-                  <a:cubicBezTo>
-                    <a:pt x="3340757" y="2608522"/>
-                    <a:pt x="3352649" y="2607827"/>
-                    <a:pt x="3364665" y="2607363"/>
-                  </a:cubicBezTo>
-                  <a:cubicBezTo>
-                    <a:pt x="3376679" y="2606784"/>
-                    <a:pt x="3388695" y="2606438"/>
-                    <a:pt x="3400587" y="2605627"/>
-                  </a:cubicBezTo>
-                  <a:lnTo>
-                    <a:pt x="3436387" y="2602847"/>
-                  </a:lnTo>
-                  <a:cubicBezTo>
-                    <a:pt x="3484079" y="2599257"/>
-                    <a:pt x="3531404" y="2593235"/>
-                    <a:pt x="3578361" y="2586286"/>
-                  </a:cubicBezTo>
-                  <a:cubicBezTo>
-                    <a:pt x="3766310" y="2556871"/>
-                    <a:pt x="3947025" y="2499314"/>
-                    <a:pt x="4119159" y="2418594"/>
-                  </a:cubicBezTo>
-                  <a:cubicBezTo>
-                    <a:pt x="4291907" y="2338801"/>
-                    <a:pt x="4456317" y="2236657"/>
-                    <a:pt x="4618765" y="2124668"/>
-                  </a:cubicBezTo>
-                  <a:cubicBezTo>
-                    <a:pt x="4659346" y="2096759"/>
-                    <a:pt x="4699682" y="2067575"/>
-                    <a:pt x="4739895" y="2038275"/>
-                  </a:cubicBezTo>
-                  <a:cubicBezTo>
-                    <a:pt x="4780355" y="2008976"/>
-                    <a:pt x="4820691" y="1979212"/>
-                    <a:pt x="4861027" y="1948986"/>
-                  </a:cubicBezTo>
-                  <a:lnTo>
-                    <a:pt x="5106354" y="1763690"/>
-                  </a:lnTo>
-                  <a:lnTo>
-                    <a:pt x="5275533" y="1641017"/>
-                  </a:lnTo>
-                  <a:lnTo>
-                    <a:pt x="5275533" y="2257481"/>
-                  </a:lnTo>
-                  <a:lnTo>
-                    <a:pt x="5168881" y="2332084"/>
-                  </a:lnTo>
-                  <a:cubicBezTo>
-                    <a:pt x="5125235" y="2362079"/>
-                    <a:pt x="5081099" y="2391958"/>
-                    <a:pt x="5036225" y="2421489"/>
-                  </a:cubicBezTo>
-                  <a:cubicBezTo>
-                    <a:pt x="4991231" y="2450790"/>
-                    <a:pt x="4945867" y="2479857"/>
-                    <a:pt x="4899401" y="2508347"/>
-                  </a:cubicBezTo>
-                  <a:cubicBezTo>
-                    <a:pt x="4806959" y="2565440"/>
-                    <a:pt x="4711574" y="2620798"/>
-                    <a:pt x="4612145" y="2671407"/>
-                  </a:cubicBezTo>
-                  <a:cubicBezTo>
-                    <a:pt x="4512836" y="2722247"/>
-                    <a:pt x="4410095" y="2769496"/>
-                    <a:pt x="4303187" y="2810030"/>
-                  </a:cubicBezTo>
-                  <a:cubicBezTo>
-                    <a:pt x="4090349" y="2892256"/>
-                    <a:pt x="3861694" y="2947728"/>
-                    <a:pt x="3630835" y="2969500"/>
-                  </a:cubicBezTo>
-                  <a:cubicBezTo>
-                    <a:pt x="3573089" y="2974712"/>
-                    <a:pt x="3515343" y="2978649"/>
-                    <a:pt x="3457719" y="2979808"/>
-                  </a:cubicBezTo>
-                  <a:lnTo>
-                    <a:pt x="3414441" y="2980733"/>
-                  </a:lnTo>
-                  <a:cubicBezTo>
-                    <a:pt x="3400097" y="2980850"/>
-                    <a:pt x="3385630" y="2980502"/>
-                    <a:pt x="3371285" y="2980502"/>
-                  </a:cubicBezTo>
-                  <a:lnTo>
-                    <a:pt x="3328252" y="2980039"/>
-                  </a:lnTo>
-                  <a:lnTo>
-                    <a:pt x="3286445" y="2978534"/>
-                  </a:lnTo>
-                  <a:cubicBezTo>
-                    <a:pt x="3175121" y="2975174"/>
-                    <a:pt x="3063553" y="2966837"/>
-                    <a:pt x="2952475" y="2953402"/>
-                  </a:cubicBezTo>
-                  <a:cubicBezTo>
-                    <a:pt x="2841275" y="2940664"/>
-                    <a:pt x="2730319" y="2922365"/>
-                    <a:pt x="2620591" y="2898046"/>
-                  </a:cubicBezTo>
-                  <a:cubicBezTo>
-                    <a:pt x="2510984" y="2873494"/>
-                    <a:pt x="2402235" y="2844426"/>
-                    <a:pt x="2294591" y="2811305"/>
-                  </a:cubicBezTo>
-                  <a:cubicBezTo>
-                    <a:pt x="2079669" y="2744483"/>
-                    <a:pt x="1867198" y="2661331"/>
-                    <a:pt x="1670544" y="2550501"/>
-                  </a:cubicBezTo>
-                  <a:cubicBezTo>
-                    <a:pt x="1473767" y="2439903"/>
-                    <a:pt x="1298079" y="2299657"/>
-                    <a:pt x="1144703" y="2144472"/>
-                  </a:cubicBezTo>
-                  <a:cubicBezTo>
-                    <a:pt x="1067586" y="2066996"/>
-                    <a:pt x="997458" y="1984539"/>
-                    <a:pt x="931497" y="1900114"/>
-                  </a:cubicBezTo>
-                  <a:cubicBezTo>
-                    <a:pt x="865906" y="1815342"/>
-                    <a:pt x="803500" y="1729295"/>
-                    <a:pt x="745265" y="1641395"/>
-                  </a:cubicBezTo>
-                  <a:cubicBezTo>
-                    <a:pt x="730307" y="1619623"/>
-                    <a:pt x="716207" y="1597503"/>
-                    <a:pt x="701741" y="1575500"/>
-                  </a:cubicBezTo>
-                  <a:lnTo>
-                    <a:pt x="660178" y="1511573"/>
-                  </a:lnTo>
-                  <a:cubicBezTo>
-                    <a:pt x="633574" y="1470229"/>
-                    <a:pt x="605989" y="1429232"/>
-                    <a:pt x="578158" y="1387656"/>
-                  </a:cubicBezTo>
-                  <a:lnTo>
-                    <a:pt x="408230" y="1134497"/>
-                  </a:lnTo>
-                  <a:cubicBezTo>
-                    <a:pt x="351220" y="1048219"/>
-                    <a:pt x="294945" y="959392"/>
-                    <a:pt x="242349" y="866860"/>
-                  </a:cubicBezTo>
-                  <a:cubicBezTo>
-                    <a:pt x="216112" y="820536"/>
-                    <a:pt x="190734" y="773402"/>
-                    <a:pt x="167562" y="724994"/>
-                  </a:cubicBezTo>
-                  <a:cubicBezTo>
-                    <a:pt x="144513" y="676469"/>
-                    <a:pt x="123057" y="627019"/>
-                    <a:pt x="104054" y="576525"/>
-                  </a:cubicBezTo>
-                  <a:cubicBezTo>
-                    <a:pt x="85418" y="525917"/>
-                    <a:pt x="68867" y="474613"/>
-                    <a:pt x="55381" y="422499"/>
-                  </a:cubicBezTo>
-                  <a:cubicBezTo>
-                    <a:pt x="49006" y="396442"/>
-                    <a:pt x="42508" y="370269"/>
-                    <a:pt x="37236" y="343980"/>
-                  </a:cubicBezTo>
-                  <a:lnTo>
-                    <a:pt x="29267" y="304604"/>
-                  </a:lnTo>
-                  <a:lnTo>
-                    <a:pt x="22646" y="265113"/>
-                  </a:lnTo>
-                  <a:cubicBezTo>
-                    <a:pt x="14003" y="212420"/>
-                    <a:pt x="7872" y="159582"/>
-                    <a:pt x="3903" y="106787"/>
-                  </a:cubicBezTo>
-                  <a:close/>
-                </a:path>
-              </a:pathLst>
-            </a:custGeom>
-            <a:gradFill>
-              <a:gsLst>
-                <a:gs pos="2000">
-                  <a:schemeClr val="bg1">
-                    <a:alpha val="10000"/>
-                  </a:schemeClr>
-                </a:gs>
-                <a:gs pos="16000">
-                  <a:schemeClr val="accent6">
-                    <a:alpha val="10000"/>
-                  </a:schemeClr>
-                </a:gs>
-                <a:gs pos="100000">
-                  <a:schemeClr val="bg1">
-                    <a:alpha val="10000"/>
-                  </a:schemeClr>
-                </a:gs>
-                <a:gs pos="85000">
-                  <a:schemeClr val="accent1">
-                    <a:alpha val="10000"/>
-                  </a:schemeClr>
-                </a:gs>
-              </a:gsLst>
-              <a:lin ang="12000000" scaled="0"/>
-            </a:gradFill>
-            <a:ln>
-              <a:noFill/>
-            </a:ln>
-          </p:spPr>
-          <p:style>
-            <a:lnRef idx="2">
-              <a:schemeClr val="accent1">
-                <a:shade val="50000"/>
-              </a:schemeClr>
-            </a:lnRef>
-            <a:fillRef idx="1">
-              <a:schemeClr val="accent1"/>
-            </a:fillRef>
-            <a:effectRef idx="0">
-              <a:schemeClr val="accent1"/>
-            </a:effectRef>
-            <a:fontRef idx="minor">
-              <a:schemeClr val="lt1"/>
-            </a:fontRef>
-          </p:style>
-          <p:txBody>
-            <a:bodyPr rtlCol="0" anchor="ctr"/>
-            <a:lstStyle/>
-            <a:p>
-              <a:pPr algn="ctr"/>
-              <a:endParaRPr lang="en-US"/>
-            </a:p>
-          </p:txBody>
-        </p:sp>
-        <p:sp>
-          <p:nvSpPr>
-            <p:cNvPr id="41" name="Freeform: Shape 40">
-              <a:extLst>
-                <a:ext uri="{FF2B5EF4-FFF2-40B4-BE49-F238E27FC236}">
-                  <a16:creationId xmlns:a16="http://schemas.microsoft.com/office/drawing/2014/main" id="{6F35C856-5B70-4CA2-BB8F-A37197D8F94F}"/>
-                </a:ext>
-                <a:ext uri="{C183D7F6-B498-43B3-948B-1728B52AA6E4}">
-                  <adec:decorative xmlns:adec="http://schemas.microsoft.com/office/drawing/2017/decorative" val="1"/>
-                </a:ext>
-              </a:extLst>
-            </p:cNvPr>
-            <p:cNvSpPr/>
-            <p:nvPr>
-              <p:extLst>
-                <p:ext uri="{386F3935-93C4-4BCD-93E2-E3B085C9AB24}">
-                  <p16:designElem xmlns:p16="http://schemas.microsoft.com/office/powerpoint/2015/main" val="1"/>
-                </p:ext>
-              </p:extLst>
-            </p:nvPr>
-          </p:nvSpPr>
-          <p:spPr>
-            <a:xfrm>
-              <a:off x="6921214" y="-1"/>
-              <a:ext cx="5270786" cy="2927775"/>
-            </a:xfrm>
-            <a:custGeom>
-              <a:avLst/>
-              <a:gdLst>
-                <a:gd name="connsiteX0" fmla="*/ 0 w 5270786"/>
-                <a:gd name="connsiteY0" fmla="*/ 0 h 2927775"/>
-                <a:gd name="connsiteX1" fmla="*/ 613805 w 5270786"/>
-                <a:gd name="connsiteY1" fmla="*/ 0 h 2927775"/>
-                <a:gd name="connsiteX2" fmla="*/ 618487 w 5270786"/>
-                <a:gd name="connsiteY2" fmla="*/ 85404 h 2927775"/>
-                <a:gd name="connsiteX3" fmla="*/ 1054084 w 5270786"/>
-                <a:gd name="connsiteY3" fmla="*/ 895200 h 2927775"/>
-                <a:gd name="connsiteX4" fmla="*/ 1276976 w 5270786"/>
-                <a:gd name="connsiteY4" fmla="*/ 1191325 h 2927775"/>
-                <a:gd name="connsiteX5" fmla="*/ 3368450 w 5270786"/>
-                <a:gd name="connsiteY5" fmla="*/ 2348843 h 2927775"/>
-                <a:gd name="connsiteX6" fmla="*/ 4956151 w 5270786"/>
-                <a:gd name="connsiteY6" fmla="*/ 1636730 h 2927775"/>
-                <a:gd name="connsiteX7" fmla="*/ 5149372 w 5270786"/>
-                <a:gd name="connsiteY7" fmla="*/ 1495325 h 2927775"/>
-                <a:gd name="connsiteX8" fmla="*/ 5270786 w 5270786"/>
-                <a:gd name="connsiteY8" fmla="*/ 1406110 h 2927775"/>
-                <a:gd name="connsiteX9" fmla="*/ 5270786 w 5270786"/>
-                <a:gd name="connsiteY9" fmla="*/ 2138641 h 2927775"/>
-                <a:gd name="connsiteX10" fmla="*/ 5112925 w 5270786"/>
-                <a:gd name="connsiteY10" fmla="*/ 2253730 h 2927775"/>
-                <a:gd name="connsiteX11" fmla="*/ 3368327 w 5270786"/>
-                <a:gd name="connsiteY11" fmla="*/ 2927775 h 2927775"/>
-                <a:gd name="connsiteX12" fmla="*/ 769646 w 5270786"/>
-                <a:gd name="connsiteY12" fmla="*/ 1516288 h 2927775"/>
-                <a:gd name="connsiteX13" fmla="*/ 3149 w 5270786"/>
-                <a:gd name="connsiteY13" fmla="*/ 85252 h 2927775"/>
-              </a:gdLst>
-              <a:ahLst/>
-              <a:cxnLst>
-                <a:cxn ang="0">
-                  <a:pos x="connsiteX0" y="connsiteY0"/>
-                </a:cxn>
-                <a:cxn ang="0">
-                  <a:pos x="connsiteX1" y="connsiteY1"/>
-                </a:cxn>
-                <a:cxn ang="0">
-                  <a:pos x="connsiteX2" y="connsiteY2"/>
-                </a:cxn>
-                <a:cxn ang="0">
-                  <a:pos x="connsiteX3" y="connsiteY3"/>
-                </a:cxn>
-                <a:cxn ang="0">
-                  <a:pos x="connsiteX4" y="connsiteY4"/>
-                </a:cxn>
-                <a:cxn ang="0">
-                  <a:pos x="connsiteX5" y="connsiteY5"/>
-                </a:cxn>
-                <a:cxn ang="0">
-                  <a:pos x="connsiteX6" y="connsiteY6"/>
-                </a:cxn>
-                <a:cxn ang="0">
-                  <a:pos x="connsiteX7" y="connsiteY7"/>
-                </a:cxn>
-                <a:cxn ang="0">
-                  <a:pos x="connsiteX8" y="connsiteY8"/>
-                </a:cxn>
-                <a:cxn ang="0">
-                  <a:pos x="connsiteX9" y="connsiteY9"/>
-                </a:cxn>
-                <a:cxn ang="0">
-                  <a:pos x="connsiteX10" y="connsiteY10"/>
-                </a:cxn>
-                <a:cxn ang="0">
-                  <a:pos x="connsiteX11" y="connsiteY11"/>
-                </a:cxn>
-                <a:cxn ang="0">
-                  <a:pos x="connsiteX12" y="connsiteY12"/>
-                </a:cxn>
-                <a:cxn ang="0">
-                  <a:pos x="connsiteX13" y="connsiteY13"/>
-                </a:cxn>
-              </a:cxnLst>
-              <a:rect l="l" t="t" r="r" b="b"/>
-              <a:pathLst>
-                <a:path w="5270786" h="2927775">
-                  <a:moveTo>
-                    <a:pt x="0" y="0"/>
-                  </a:moveTo>
-                  <a:lnTo>
-                    <a:pt x="613805" y="0"/>
-                  </a:lnTo>
-                  <a:lnTo>
-                    <a:pt x="618487" y="85404"/>
-                  </a:lnTo>
-                  <a:cubicBezTo>
-                    <a:pt x="650052" y="360109"/>
-                    <a:pt x="792650" y="556543"/>
-                    <a:pt x="1054084" y="895200"/>
-                  </a:cubicBezTo>
-                  <a:cubicBezTo>
-                    <a:pt x="1126174" y="988542"/>
-                    <a:pt x="1200716" y="1085128"/>
-                    <a:pt x="1276976" y="1191325"/>
-                  </a:cubicBezTo>
-                  <a:cubicBezTo>
-                    <a:pt x="1859704" y="2002688"/>
-                    <a:pt x="2485223" y="2348843"/>
-                    <a:pt x="3368450" y="2348843"/>
-                  </a:cubicBezTo>
-                  <a:cubicBezTo>
-                    <a:pt x="3948114" y="2348843"/>
-                    <a:pt x="4373422" y="2066846"/>
-                    <a:pt x="4956151" y="1636730"/>
-                  </a:cubicBezTo>
-                  <a:cubicBezTo>
-                    <a:pt x="5021253" y="1588668"/>
-                    <a:pt x="5086356" y="1541186"/>
-                    <a:pt x="5149372" y="1495325"/>
-                  </a:cubicBezTo>
-                  <a:lnTo>
-                    <a:pt x="5270786" y="1406110"/>
-                  </a:lnTo>
-                  <a:lnTo>
-                    <a:pt x="5270786" y="2138641"/>
-                  </a:lnTo>
-                  <a:lnTo>
-                    <a:pt x="5112925" y="2253730"/>
-                  </a:lnTo>
-                  <a:cubicBezTo>
-                    <a:pt x="4598179" y="2621786"/>
-                    <a:pt x="4074961" y="2927775"/>
-                    <a:pt x="3368327" y="2927775"/>
-                  </a:cubicBezTo>
-                  <a:cubicBezTo>
-                    <a:pt x="2170746" y="2927775"/>
-                    <a:pt x="1393203" y="2384512"/>
-                    <a:pt x="769646" y="1516288"/>
-                  </a:cubicBezTo>
-                  <a:cubicBezTo>
-                    <a:pt x="418850" y="1027932"/>
-                    <a:pt x="48120" y="683401"/>
-                    <a:pt x="3149" y="85252"/>
-                  </a:cubicBezTo>
-                  <a:close/>
-                </a:path>
-              </a:pathLst>
-            </a:custGeom>
-            <a:gradFill>
-              <a:gsLst>
-                <a:gs pos="2000">
-                  <a:schemeClr val="bg1">
-                    <a:alpha val="10000"/>
-                  </a:schemeClr>
-                </a:gs>
-                <a:gs pos="16000">
-                  <a:schemeClr val="accent6">
-                    <a:alpha val="10000"/>
-                  </a:schemeClr>
-                </a:gs>
-                <a:gs pos="100000">
-                  <a:schemeClr val="bg1">
-                    <a:alpha val="10000"/>
-                  </a:schemeClr>
-                </a:gs>
-                <a:gs pos="85000">
-                  <a:schemeClr val="accent1">
-                    <a:alpha val="10000"/>
-                  </a:schemeClr>
-                </a:gs>
-              </a:gsLst>
-              <a:lin ang="12000000" scaled="0"/>
-            </a:gradFill>
-            <a:ln>
-              <a:noFill/>
-            </a:ln>
-          </p:spPr>
-          <p:style>
-            <a:lnRef idx="2">
-              <a:schemeClr val="accent1">
-                <a:shade val="50000"/>
-              </a:schemeClr>
-            </a:lnRef>
-            <a:fillRef idx="1">
-              <a:schemeClr val="accent1"/>
-            </a:fillRef>
-            <a:effectRef idx="0">
-              <a:schemeClr val="accent1"/>
-            </a:effectRef>
-            <a:fontRef idx="minor">
-              <a:schemeClr val="lt1"/>
-            </a:fontRef>
-          </p:style>
-          <p:txBody>
-            <a:bodyPr rtlCol="0" anchor="ctr"/>
-            <a:lstStyle/>
-            <a:p>
-              <a:pPr algn="ctr"/>
-              <a:endParaRPr lang="en-US"/>
-            </a:p>
-          </p:txBody>
-        </p:sp>
-        <p:sp>
-          <p:nvSpPr>
-            <p:cNvPr id="42" name="Freeform: Shape 41">
-              <a:extLst>
-                <a:ext uri="{FF2B5EF4-FFF2-40B4-BE49-F238E27FC236}">
-                  <a16:creationId xmlns:a16="http://schemas.microsoft.com/office/drawing/2014/main" id="{550FD8B0-DE97-47B1-84ED-67A3BD00FE2F}"/>
-                </a:ext>
-                <a:ext uri="{C183D7F6-B498-43B3-948B-1728B52AA6E4}">
-                  <adec:decorative xmlns:adec="http://schemas.microsoft.com/office/drawing/2017/decorative" val="1"/>
-                </a:ext>
-              </a:extLst>
-            </p:cNvPr>
-            <p:cNvSpPr/>
-            <p:nvPr>
-              <p:extLst>
-                <p:ext uri="{386F3935-93C4-4BCD-93E2-E3B085C9AB24}">
-                  <p16:designElem xmlns:p16="http://schemas.microsoft.com/office/powerpoint/2015/main" val="1"/>
-                </p:ext>
-              </p:extLst>
-            </p:nvPr>
-          </p:nvSpPr>
-          <p:spPr>
-            <a:xfrm>
-              <a:off x="6921214" y="-1"/>
-              <a:ext cx="5270786" cy="2927775"/>
-            </a:xfrm>
-            <a:custGeom>
-              <a:avLst/>
-              <a:gdLst>
-                <a:gd name="connsiteX0" fmla="*/ 0 w 5270786"/>
-                <a:gd name="connsiteY0" fmla="*/ 0 h 2927775"/>
-                <a:gd name="connsiteX1" fmla="*/ 736294 w 5270786"/>
-                <a:gd name="connsiteY1" fmla="*/ 0 h 2927775"/>
-                <a:gd name="connsiteX2" fmla="*/ 740298 w 5270786"/>
-                <a:gd name="connsiteY2" fmla="*/ 72745 h 2927775"/>
-                <a:gd name="connsiteX3" fmla="*/ 1153024 w 5270786"/>
-                <a:gd name="connsiteY3" fmla="*/ 826989 h 2927775"/>
-                <a:gd name="connsiteX4" fmla="*/ 1378368 w 5270786"/>
-                <a:gd name="connsiteY4" fmla="*/ 1126356 h 2927775"/>
-                <a:gd name="connsiteX5" fmla="*/ 2238056 w 5270786"/>
-                <a:gd name="connsiteY5" fmla="*/ 1955322 h 2927775"/>
-                <a:gd name="connsiteX6" fmla="*/ 3368327 w 5270786"/>
-                <a:gd name="connsiteY6" fmla="*/ 2233033 h 2927775"/>
-                <a:gd name="connsiteX7" fmla="*/ 4095360 w 5270786"/>
-                <a:gd name="connsiteY7" fmla="*/ 2056192 h 2927775"/>
-                <a:gd name="connsiteX8" fmla="*/ 4880506 w 5270786"/>
-                <a:gd name="connsiteY8" fmla="*/ 1545587 h 2927775"/>
-                <a:gd name="connsiteX9" fmla="*/ 5074340 w 5270786"/>
-                <a:gd name="connsiteY9" fmla="*/ 1403721 h 2927775"/>
-                <a:gd name="connsiteX10" fmla="*/ 5270786 w 5270786"/>
-                <a:gd name="connsiteY10" fmla="*/ 1259367 h 2927775"/>
-                <a:gd name="connsiteX11" fmla="*/ 5270786 w 5270786"/>
-                <a:gd name="connsiteY11" fmla="*/ 2138641 h 2927775"/>
-                <a:gd name="connsiteX12" fmla="*/ 5112925 w 5270786"/>
-                <a:gd name="connsiteY12" fmla="*/ 2253730 h 2927775"/>
-                <a:gd name="connsiteX13" fmla="*/ 3368327 w 5270786"/>
-                <a:gd name="connsiteY13" fmla="*/ 2927775 h 2927775"/>
-                <a:gd name="connsiteX14" fmla="*/ 769646 w 5270786"/>
-                <a:gd name="connsiteY14" fmla="*/ 1516288 h 2927775"/>
-                <a:gd name="connsiteX15" fmla="*/ 3149 w 5270786"/>
-                <a:gd name="connsiteY15" fmla="*/ 85252 h 2927775"/>
-              </a:gdLst>
-              <a:ahLst/>
-              <a:cxnLst>
-                <a:cxn ang="0">
-                  <a:pos x="connsiteX0" y="connsiteY0"/>
-                </a:cxn>
-                <a:cxn ang="0">
-                  <a:pos x="connsiteX1" y="connsiteY1"/>
-                </a:cxn>
-                <a:cxn ang="0">
-                  <a:pos x="connsiteX2" y="connsiteY2"/>
-                </a:cxn>
-                <a:cxn ang="0">
-                  <a:pos x="connsiteX3" y="connsiteY3"/>
-                </a:cxn>
-                <a:cxn ang="0">
-                  <a:pos x="connsiteX4" y="connsiteY4"/>
-                </a:cxn>
-                <a:cxn ang="0">
-                  <a:pos x="connsiteX5" y="connsiteY5"/>
-                </a:cxn>
-                <a:cxn ang="0">
-                  <a:pos x="connsiteX6" y="connsiteY6"/>
-                </a:cxn>
-                <a:cxn ang="0">
-                  <a:pos x="connsiteX7" y="connsiteY7"/>
-                </a:cxn>
-                <a:cxn ang="0">
-                  <a:pos x="connsiteX8" y="connsiteY8"/>
-                </a:cxn>
-                <a:cxn ang="0">
-                  <a:pos x="connsiteX9" y="connsiteY9"/>
-                </a:cxn>
-                <a:cxn ang="0">
-                  <a:pos x="connsiteX10" y="connsiteY10"/>
-                </a:cxn>
-                <a:cxn ang="0">
-                  <a:pos x="connsiteX11" y="connsiteY11"/>
-                </a:cxn>
-                <a:cxn ang="0">
-                  <a:pos x="connsiteX12" y="connsiteY12"/>
-                </a:cxn>
-                <a:cxn ang="0">
-                  <a:pos x="connsiteX13" y="connsiteY13"/>
-                </a:cxn>
-                <a:cxn ang="0">
-                  <a:pos x="connsiteX14" y="connsiteY14"/>
-                </a:cxn>
-                <a:cxn ang="0">
-                  <a:pos x="connsiteX15" y="connsiteY15"/>
-                </a:cxn>
-              </a:cxnLst>
-              <a:rect l="l" t="t" r="r" b="b"/>
-              <a:pathLst>
-                <a:path w="5270786" h="2927775">
-                  <a:moveTo>
-                    <a:pt x="0" y="0"/>
-                  </a:moveTo>
-                  <a:lnTo>
-                    <a:pt x="736294" y="0"/>
-                  </a:lnTo>
-                  <a:lnTo>
-                    <a:pt x="740298" y="72745"/>
-                  </a:lnTo>
-                  <a:cubicBezTo>
-                    <a:pt x="768839" y="319371"/>
-                    <a:pt x="898885" y="497858"/>
-                    <a:pt x="1153024" y="826989"/>
-                  </a:cubicBezTo>
-                  <a:cubicBezTo>
-                    <a:pt x="1225727" y="921142"/>
-                    <a:pt x="1300882" y="1018537"/>
-                    <a:pt x="1378368" y="1126356"/>
-                  </a:cubicBezTo>
-                  <a:cubicBezTo>
-                    <a:pt x="1652384" y="1507833"/>
-                    <a:pt x="1933512" y="1779060"/>
-                    <a:pt x="2238056" y="1955322"/>
-                  </a:cubicBezTo>
-                  <a:cubicBezTo>
-                    <a:pt x="2560868" y="2142238"/>
-                    <a:pt x="2930637" y="2233033"/>
-                    <a:pt x="3368327" y="2233033"/>
-                  </a:cubicBezTo>
-                  <a:cubicBezTo>
-                    <a:pt x="3616720" y="2233033"/>
-                    <a:pt x="3847703" y="2176866"/>
-                    <a:pt x="4095360" y="2056192"/>
-                  </a:cubicBezTo>
-                  <a:cubicBezTo>
-                    <a:pt x="4349636" y="1932276"/>
-                    <a:pt x="4601340" y="1751613"/>
-                    <a:pt x="4880506" y="1545587"/>
-                  </a:cubicBezTo>
-                  <a:cubicBezTo>
-                    <a:pt x="4945974" y="1497295"/>
-                    <a:pt x="5011199" y="1449697"/>
-                    <a:pt x="5074340" y="1403721"/>
-                  </a:cubicBezTo>
-                  <a:lnTo>
-                    <a:pt x="5270786" y="1259367"/>
-                  </a:lnTo>
-                  <a:lnTo>
-                    <a:pt x="5270786" y="2138641"/>
-                  </a:lnTo>
-                  <a:lnTo>
-                    <a:pt x="5112925" y="2253730"/>
-                  </a:lnTo>
-                  <a:cubicBezTo>
-                    <a:pt x="4598179" y="2621786"/>
-                    <a:pt x="4074961" y="2927775"/>
-                    <a:pt x="3368327" y="2927775"/>
-                  </a:cubicBezTo>
-                  <a:cubicBezTo>
-                    <a:pt x="2170746" y="2927775"/>
-                    <a:pt x="1393203" y="2384512"/>
-                    <a:pt x="769646" y="1516288"/>
-                  </a:cubicBezTo>
-                  <a:cubicBezTo>
-                    <a:pt x="418850" y="1027932"/>
-                    <a:pt x="48120" y="683401"/>
-                    <a:pt x="3149" y="85252"/>
-                  </a:cubicBezTo>
-                  <a:close/>
-                </a:path>
-              </a:pathLst>
-            </a:custGeom>
-            <a:gradFill>
-              <a:gsLst>
-                <a:gs pos="2000">
-                  <a:schemeClr val="bg1">
-                    <a:alpha val="10000"/>
-                  </a:schemeClr>
-                </a:gs>
-                <a:gs pos="16000">
-                  <a:schemeClr val="accent6">
-                    <a:alpha val="10000"/>
-                  </a:schemeClr>
-                </a:gs>
-                <a:gs pos="100000">
-                  <a:schemeClr val="bg1">
-                    <a:alpha val="10000"/>
-                  </a:schemeClr>
-                </a:gs>
-                <a:gs pos="85000">
-                  <a:schemeClr val="accent1">
-                    <a:alpha val="10000"/>
-                  </a:schemeClr>
-                </a:gs>
-              </a:gsLst>
-              <a:lin ang="12000000" scaled="0"/>
-            </a:gradFill>
-            <a:ln>
-              <a:noFill/>
-            </a:ln>
-          </p:spPr>
-          <p:style>
-            <a:lnRef idx="2">
-              <a:schemeClr val="accent1">
-                <a:shade val="50000"/>
-              </a:schemeClr>
-            </a:lnRef>
-            <a:fillRef idx="1">
-              <a:schemeClr val="accent1"/>
-            </a:fillRef>
-            <a:effectRef idx="0">
-              <a:schemeClr val="accent1"/>
-            </a:effectRef>
-            <a:fontRef idx="minor">
-              <a:schemeClr val="lt1"/>
-            </a:fontRef>
-          </p:style>
-          <p:txBody>
-            <a:bodyPr rtlCol="0" anchor="ctr"/>
-            <a:lstStyle/>
-            <a:p>
-              <a:pPr algn="ctr"/>
-              <a:endParaRPr lang="en-US"/>
-            </a:p>
-          </p:txBody>
-        </p:sp>
-      </p:grpSp>
-      <p:sp>
-        <p:nvSpPr>
-          <p:cNvPr id="6" name="TextBox 5">
-            <a:extLst>
-              <a:ext uri="{FF2B5EF4-FFF2-40B4-BE49-F238E27FC236}">
-                <a16:creationId xmlns:a16="http://schemas.microsoft.com/office/drawing/2014/main" id="{BB74BAEA-8FA4-840E-3E5C-F9283350FD10}"/>
-              </a:ext>
-            </a:extLst>
-          </p:cNvPr>
-          <p:cNvSpPr txBox="1"/>
-          <p:nvPr/>
-        </p:nvSpPr>
-        <p:spPr>
-          <a:xfrm>
-            <a:off x="1460066" y="1850033"/>
             <a:ext cx="6411725" cy="2585323"/>
           </a:xfrm>
           <a:prstGeom prst="rect">
@@ -13586,7 +10087,7 @@
 </p:sld>
 </file>
 
-<file path=ppt/slides/slide13.xml><?xml version="1.0" encoding="utf-8"?>
+<file path=ppt/slides/slide12.xml><?xml version="1.0" encoding="utf-8"?>
 <p:sld xmlns:a="http://schemas.openxmlformats.org/drawingml/2006/main" xmlns:r="http://schemas.openxmlformats.org/officeDocument/2006/relationships" xmlns:p="http://schemas.openxmlformats.org/presentationml/2006/main">
   <p:cSld>
     <p:bg>

</xml_diff>